<commit_message>
litle changes in scheme
</commit_message>
<xml_diff>
--- a/schemeofcode.pptx
+++ b/schemeofcode.pptx
@@ -262,7 +262,7 @@
           <a:p>
             <a:fld id="{7A3C3441-2C70-4949-8FF7-1C72443CF9D3}" type="datetimeFigureOut">
               <a:rPr lang="fr-BE" smtClean="0"/>
-              <a:t>27-11-21</a:t>
+              <a:t>29-11-21</a:t>
             </a:fld>
             <a:endParaRPr lang="fr-BE"/>
           </a:p>
@@ -462,7 +462,7 @@
           <a:p>
             <a:fld id="{7A3C3441-2C70-4949-8FF7-1C72443CF9D3}" type="datetimeFigureOut">
               <a:rPr lang="fr-BE" smtClean="0"/>
-              <a:t>27-11-21</a:t>
+              <a:t>29-11-21</a:t>
             </a:fld>
             <a:endParaRPr lang="fr-BE"/>
           </a:p>
@@ -672,7 +672,7 @@
           <a:p>
             <a:fld id="{7A3C3441-2C70-4949-8FF7-1C72443CF9D3}" type="datetimeFigureOut">
               <a:rPr lang="fr-BE" smtClean="0"/>
-              <a:t>27-11-21</a:t>
+              <a:t>29-11-21</a:t>
             </a:fld>
             <a:endParaRPr lang="fr-BE"/>
           </a:p>
@@ -872,7 +872,7 @@
           <a:p>
             <a:fld id="{7A3C3441-2C70-4949-8FF7-1C72443CF9D3}" type="datetimeFigureOut">
               <a:rPr lang="fr-BE" smtClean="0"/>
-              <a:t>27-11-21</a:t>
+              <a:t>29-11-21</a:t>
             </a:fld>
             <a:endParaRPr lang="fr-BE"/>
           </a:p>
@@ -1148,7 +1148,7 @@
           <a:p>
             <a:fld id="{7A3C3441-2C70-4949-8FF7-1C72443CF9D3}" type="datetimeFigureOut">
               <a:rPr lang="fr-BE" smtClean="0"/>
-              <a:t>27-11-21</a:t>
+              <a:t>29-11-21</a:t>
             </a:fld>
             <a:endParaRPr lang="fr-BE"/>
           </a:p>
@@ -1416,7 +1416,7 @@
           <a:p>
             <a:fld id="{7A3C3441-2C70-4949-8FF7-1C72443CF9D3}" type="datetimeFigureOut">
               <a:rPr lang="fr-BE" smtClean="0"/>
-              <a:t>27-11-21</a:t>
+              <a:t>29-11-21</a:t>
             </a:fld>
             <a:endParaRPr lang="fr-BE"/>
           </a:p>
@@ -1831,7 +1831,7 @@
           <a:p>
             <a:fld id="{7A3C3441-2C70-4949-8FF7-1C72443CF9D3}" type="datetimeFigureOut">
               <a:rPr lang="fr-BE" smtClean="0"/>
-              <a:t>27-11-21</a:t>
+              <a:t>29-11-21</a:t>
             </a:fld>
             <a:endParaRPr lang="fr-BE"/>
           </a:p>
@@ -1973,7 +1973,7 @@
           <a:p>
             <a:fld id="{7A3C3441-2C70-4949-8FF7-1C72443CF9D3}" type="datetimeFigureOut">
               <a:rPr lang="fr-BE" smtClean="0"/>
-              <a:t>27-11-21</a:t>
+              <a:t>29-11-21</a:t>
             </a:fld>
             <a:endParaRPr lang="fr-BE"/>
           </a:p>
@@ -2086,7 +2086,7 @@
           <a:p>
             <a:fld id="{7A3C3441-2C70-4949-8FF7-1C72443CF9D3}" type="datetimeFigureOut">
               <a:rPr lang="fr-BE" smtClean="0"/>
-              <a:t>27-11-21</a:t>
+              <a:t>29-11-21</a:t>
             </a:fld>
             <a:endParaRPr lang="fr-BE"/>
           </a:p>
@@ -2399,7 +2399,7 @@
           <a:p>
             <a:fld id="{7A3C3441-2C70-4949-8FF7-1C72443CF9D3}" type="datetimeFigureOut">
               <a:rPr lang="fr-BE" smtClean="0"/>
-              <a:t>27-11-21</a:t>
+              <a:t>29-11-21</a:t>
             </a:fld>
             <a:endParaRPr lang="fr-BE"/>
           </a:p>
@@ -2688,7 +2688,7 @@
           <a:p>
             <a:fld id="{7A3C3441-2C70-4949-8FF7-1C72443CF9D3}" type="datetimeFigureOut">
               <a:rPr lang="fr-BE" smtClean="0"/>
-              <a:t>27-11-21</a:t>
+              <a:t>29-11-21</a:t>
             </a:fld>
             <a:endParaRPr lang="fr-BE"/>
           </a:p>
@@ -2931,7 +2931,7 @@
           <a:p>
             <a:fld id="{7A3C3441-2C70-4949-8FF7-1C72443CF9D3}" type="datetimeFigureOut">
               <a:rPr lang="fr-BE" smtClean="0"/>
-              <a:t>27-11-21</a:t>
+              <a:t>29-11-21</a:t>
             </a:fld>
             <a:endParaRPr lang="fr-BE"/>
           </a:p>
@@ -3348,711 +3348,924 @@
           <a:chExt cx="0" cy="0"/>
         </a:xfrm>
       </p:grpSpPr>
-      <p:sp>
-        <p:nvSpPr>
-          <p:cNvPr id="4" name="Ellipse 3">
-            <a:extLst>
-              <a:ext uri="{FF2B5EF4-FFF2-40B4-BE49-F238E27FC236}">
-                <a16:creationId xmlns:a16="http://schemas.microsoft.com/office/drawing/2014/main" id="{B50357BF-3EEE-44EB-A9B6-6A499B828BAA}"/>
-              </a:ext>
-            </a:extLst>
-          </p:cNvPr>
-          <p:cNvSpPr/>
+      <p:grpSp>
+        <p:nvGrpSpPr>
+          <p:cNvPr id="80" name="Groupe 79">
+            <a:extLst>
+              <a:ext uri="{FF2B5EF4-FFF2-40B4-BE49-F238E27FC236}">
+                <a16:creationId xmlns:a16="http://schemas.microsoft.com/office/drawing/2014/main" id="{2DF9F2D6-9273-47E2-B4E1-8108953582B4}"/>
+              </a:ext>
+            </a:extLst>
+          </p:cNvPr>
+          <p:cNvGrpSpPr/>
           <p:nvPr/>
-        </p:nvSpPr>
-        <p:spPr>
+        </p:nvGrpSpPr>
+        <p:grpSpPr>
           <a:xfrm>
-            <a:off x="4558145" y="353292"/>
-            <a:ext cx="2632364" cy="1343890"/>
+            <a:off x="1000180" y="981044"/>
+            <a:ext cx="2983043" cy="1861997"/>
+            <a:chOff x="1819987" y="3068398"/>
+            <a:chExt cx="2983043" cy="1861997"/>
           </a:xfrm>
-          <a:prstGeom prst="ellipse">
-            <a:avLst/>
-          </a:prstGeom>
-        </p:spPr>
-        <p:style>
-          <a:lnRef idx="2">
-            <a:schemeClr val="accent1">
-              <a:shade val="50000"/>
-            </a:schemeClr>
-          </a:lnRef>
-          <a:fillRef idx="1">
-            <a:schemeClr val="accent1"/>
-          </a:fillRef>
-          <a:effectRef idx="0">
-            <a:schemeClr val="accent1"/>
-          </a:effectRef>
-          <a:fontRef idx="minor">
-            <a:schemeClr val="lt1"/>
-          </a:fontRef>
-        </p:style>
-        <p:txBody>
-          <a:bodyPr rtlCol="0" anchor="ctr"/>
-          <a:lstStyle/>
-          <a:p>
-            <a:pPr algn="ctr"/>
-            <a:r>
-              <a:rPr lang="fr-FR" dirty="0"/>
-              <a:t>Class : </a:t>
-            </a:r>
-            <a:r>
-              <a:rPr lang="fr-FR" dirty="0" err="1"/>
-              <a:t>MyRobot</a:t>
-            </a:r>
-            <a:endParaRPr lang="fr-BE" dirty="0"/>
-          </a:p>
-        </p:txBody>
-      </p:sp>
-      <p:sp>
-        <p:nvSpPr>
-          <p:cNvPr id="7" name="Ellipse 6">
-            <a:extLst>
-              <a:ext uri="{FF2B5EF4-FFF2-40B4-BE49-F238E27FC236}">
-                <a16:creationId xmlns:a16="http://schemas.microsoft.com/office/drawing/2014/main" id="{B3700653-A37B-47FB-B51A-F97A385A0EC3}"/>
-              </a:ext>
-            </a:extLst>
-          </p:cNvPr>
-          <p:cNvSpPr/>
-          <p:nvPr/>
-        </p:nvSpPr>
-        <p:spPr>
-          <a:xfrm>
-            <a:off x="4558145" y="2230583"/>
-            <a:ext cx="2632364" cy="1343890"/>
-          </a:xfrm>
-          <a:prstGeom prst="ellipse">
-            <a:avLst/>
-          </a:prstGeom>
-        </p:spPr>
-        <p:style>
-          <a:lnRef idx="2">
-            <a:schemeClr val="accent1">
-              <a:shade val="50000"/>
-            </a:schemeClr>
-          </a:lnRef>
-          <a:fillRef idx="1">
-            <a:schemeClr val="accent1"/>
-          </a:fillRef>
-          <a:effectRef idx="0">
-            <a:schemeClr val="accent1"/>
-          </a:effectRef>
-          <a:fontRef idx="minor">
-            <a:schemeClr val="lt1"/>
-          </a:fontRef>
-        </p:style>
-        <p:txBody>
-          <a:bodyPr rtlCol="0" anchor="ctr"/>
-          <a:lstStyle/>
-          <a:p>
-            <a:pPr algn="ctr"/>
-            <a:r>
-              <a:rPr lang="fr-FR" dirty="0" err="1"/>
-              <a:t>Actuators</a:t>
-            </a:r>
-            <a:endParaRPr lang="fr-BE" dirty="0"/>
-          </a:p>
-        </p:txBody>
-      </p:sp>
-      <p:sp>
-        <p:nvSpPr>
-          <p:cNvPr id="8" name="Ellipse 7">
-            <a:extLst>
-              <a:ext uri="{FF2B5EF4-FFF2-40B4-BE49-F238E27FC236}">
-                <a16:creationId xmlns:a16="http://schemas.microsoft.com/office/drawing/2014/main" id="{253843DF-CA1B-4B51-972C-5851CFFB42BC}"/>
-              </a:ext>
-            </a:extLst>
-          </p:cNvPr>
-          <p:cNvSpPr/>
-          <p:nvPr/>
-        </p:nvSpPr>
-        <p:spPr>
-          <a:xfrm>
-            <a:off x="1163781" y="2230583"/>
-            <a:ext cx="2632364" cy="1343890"/>
-          </a:xfrm>
-          <a:prstGeom prst="ellipse">
-            <a:avLst/>
-          </a:prstGeom>
-        </p:spPr>
-        <p:style>
-          <a:lnRef idx="2">
-            <a:schemeClr val="accent1">
-              <a:shade val="50000"/>
-            </a:schemeClr>
-          </a:lnRef>
-          <a:fillRef idx="1">
-            <a:schemeClr val="accent1"/>
-          </a:fillRef>
-          <a:effectRef idx="0">
-            <a:schemeClr val="accent1"/>
-          </a:effectRef>
-          <a:fontRef idx="minor">
-            <a:schemeClr val="lt1"/>
-          </a:fontRef>
-        </p:style>
-        <p:txBody>
-          <a:bodyPr rtlCol="0" anchor="ctr"/>
-          <a:lstStyle/>
-          <a:p>
-            <a:pPr algn="ctr"/>
-            <a:r>
-              <a:rPr lang="fr-FR" dirty="0"/>
-              <a:t>State</a:t>
-            </a:r>
-            <a:endParaRPr lang="fr-BE" dirty="0"/>
-          </a:p>
-        </p:txBody>
-      </p:sp>
-      <p:sp>
-        <p:nvSpPr>
-          <p:cNvPr id="9" name="Ellipse 8">
-            <a:extLst>
-              <a:ext uri="{FF2B5EF4-FFF2-40B4-BE49-F238E27FC236}">
-                <a16:creationId xmlns:a16="http://schemas.microsoft.com/office/drawing/2014/main" id="{D41CEB7E-1CD6-4308-A770-31C42EBE7455}"/>
-              </a:ext>
-            </a:extLst>
-          </p:cNvPr>
-          <p:cNvSpPr/>
-          <p:nvPr/>
-        </p:nvSpPr>
-        <p:spPr>
-          <a:xfrm>
-            <a:off x="7952509" y="2230583"/>
-            <a:ext cx="2632364" cy="1343890"/>
-          </a:xfrm>
-          <a:prstGeom prst="ellipse">
-            <a:avLst/>
-          </a:prstGeom>
-        </p:spPr>
-        <p:style>
-          <a:lnRef idx="2">
-            <a:schemeClr val="accent1">
-              <a:shade val="50000"/>
-            </a:schemeClr>
-          </a:lnRef>
-          <a:fillRef idx="1">
-            <a:schemeClr val="accent1"/>
-          </a:fillRef>
-          <a:effectRef idx="0">
-            <a:schemeClr val="accent1"/>
-          </a:effectRef>
-          <a:fontRef idx="minor">
-            <a:schemeClr val="lt1"/>
-          </a:fontRef>
-        </p:style>
-        <p:txBody>
-          <a:bodyPr rtlCol="0" anchor="ctr"/>
-          <a:lstStyle/>
-          <a:p>
-            <a:pPr algn="ctr"/>
-            <a:r>
-              <a:rPr lang="fr-FR" dirty="0" err="1"/>
-              <a:t>Sensors</a:t>
-            </a:r>
-            <a:endParaRPr lang="fr-BE" dirty="0"/>
-          </a:p>
-        </p:txBody>
-      </p:sp>
-      <p:sp>
-        <p:nvSpPr>
-          <p:cNvPr id="10" name="Rectangle 9">
-            <a:extLst>
-              <a:ext uri="{FF2B5EF4-FFF2-40B4-BE49-F238E27FC236}">
-                <a16:creationId xmlns:a16="http://schemas.microsoft.com/office/drawing/2014/main" id="{E8C1C5D9-82EA-46AF-9A6F-2A24DF989145}"/>
-              </a:ext>
-            </a:extLst>
-          </p:cNvPr>
-          <p:cNvSpPr/>
-          <p:nvPr/>
-        </p:nvSpPr>
-        <p:spPr>
-          <a:xfrm>
-            <a:off x="5451763" y="4592782"/>
-            <a:ext cx="845127" cy="505690"/>
-          </a:xfrm>
-          <a:prstGeom prst="rect">
-            <a:avLst/>
-          </a:prstGeom>
-        </p:spPr>
-        <p:style>
-          <a:lnRef idx="2">
-            <a:schemeClr val="accent1">
-              <a:shade val="50000"/>
-            </a:schemeClr>
-          </a:lnRef>
-          <a:fillRef idx="1">
-            <a:schemeClr val="accent1"/>
-          </a:fillRef>
-          <a:effectRef idx="0">
-            <a:schemeClr val="accent1"/>
-          </a:effectRef>
-          <a:fontRef idx="minor">
-            <a:schemeClr val="lt1"/>
-          </a:fontRef>
-        </p:style>
-        <p:txBody>
-          <a:bodyPr rtlCol="0" anchor="ctr"/>
-          <a:lstStyle/>
-          <a:p>
-            <a:pPr algn="ctr"/>
-            <a:r>
-              <a:rPr lang="fr-FR" sz="1400" dirty="0"/>
-              <a:t>Motors</a:t>
-            </a:r>
-            <a:endParaRPr lang="fr-BE" sz="1400" dirty="0"/>
-          </a:p>
-        </p:txBody>
-      </p:sp>
-      <p:sp>
-        <p:nvSpPr>
-          <p:cNvPr id="13" name="Rectangle 12">
-            <a:extLst>
-              <a:ext uri="{FF2B5EF4-FFF2-40B4-BE49-F238E27FC236}">
-                <a16:creationId xmlns:a16="http://schemas.microsoft.com/office/drawing/2014/main" id="{405FA1C5-E5D1-46AF-9069-3914F77671DD}"/>
-              </a:ext>
-            </a:extLst>
-          </p:cNvPr>
-          <p:cNvSpPr/>
-          <p:nvPr/>
-        </p:nvSpPr>
-        <p:spPr>
-          <a:xfrm>
-            <a:off x="8319655" y="4592782"/>
-            <a:ext cx="845127" cy="505690"/>
-          </a:xfrm>
-          <a:prstGeom prst="rect">
-            <a:avLst/>
-          </a:prstGeom>
-        </p:spPr>
-        <p:style>
-          <a:lnRef idx="2">
-            <a:schemeClr val="accent1">
-              <a:shade val="50000"/>
-            </a:schemeClr>
-          </a:lnRef>
-          <a:fillRef idx="1">
-            <a:schemeClr val="accent1"/>
-          </a:fillRef>
-          <a:effectRef idx="0">
-            <a:schemeClr val="accent1"/>
-          </a:effectRef>
-          <a:fontRef idx="minor">
-            <a:schemeClr val="lt1"/>
-          </a:fontRef>
-        </p:style>
-        <p:txBody>
-          <a:bodyPr rtlCol="0" anchor="ctr"/>
-          <a:lstStyle/>
-          <a:p>
-            <a:pPr algn="ctr"/>
-            <a:r>
-              <a:rPr lang="fr-FR" sz="1400" dirty="0"/>
-              <a:t>Lidar</a:t>
-            </a:r>
-            <a:endParaRPr lang="fr-BE" sz="1400" dirty="0"/>
-          </a:p>
-        </p:txBody>
-      </p:sp>
-      <p:sp>
-        <p:nvSpPr>
-          <p:cNvPr id="14" name="Rectangle 13">
-            <a:extLst>
-              <a:ext uri="{FF2B5EF4-FFF2-40B4-BE49-F238E27FC236}">
-                <a16:creationId xmlns:a16="http://schemas.microsoft.com/office/drawing/2014/main" id="{D9FB9FEC-F0DA-4B5A-82D3-4B1B6E98DB24}"/>
-              </a:ext>
-            </a:extLst>
-          </p:cNvPr>
-          <p:cNvSpPr/>
-          <p:nvPr/>
-        </p:nvSpPr>
-        <p:spPr>
-          <a:xfrm>
-            <a:off x="9490365" y="4592782"/>
-            <a:ext cx="845127" cy="505690"/>
-          </a:xfrm>
-          <a:prstGeom prst="rect">
-            <a:avLst/>
-          </a:prstGeom>
-        </p:spPr>
-        <p:style>
-          <a:lnRef idx="2">
-            <a:schemeClr val="accent1">
-              <a:shade val="50000"/>
-            </a:schemeClr>
-          </a:lnRef>
-          <a:fillRef idx="1">
-            <a:schemeClr val="accent1"/>
-          </a:fillRef>
-          <a:effectRef idx="0">
-            <a:schemeClr val="accent1"/>
-          </a:effectRef>
-          <a:fontRef idx="minor">
-            <a:schemeClr val="lt1"/>
-          </a:fontRef>
-        </p:style>
-        <p:txBody>
-          <a:bodyPr rtlCol="0" anchor="ctr"/>
-          <a:lstStyle/>
-          <a:p>
-            <a:pPr algn="ctr"/>
-            <a:r>
-              <a:rPr lang="fr-FR" sz="1400" dirty="0"/>
-              <a:t>Buttons</a:t>
-            </a:r>
-            <a:endParaRPr lang="fr-BE" sz="1400" dirty="0"/>
-          </a:p>
-        </p:txBody>
-      </p:sp>
-      <p:sp>
-        <p:nvSpPr>
-          <p:cNvPr id="16" name="Rectangle 15">
-            <a:extLst>
-              <a:ext uri="{FF2B5EF4-FFF2-40B4-BE49-F238E27FC236}">
-                <a16:creationId xmlns:a16="http://schemas.microsoft.com/office/drawing/2014/main" id="{46001A5C-5BB2-4897-8A65-1A707164C543}"/>
-              </a:ext>
-            </a:extLst>
-          </p:cNvPr>
-          <p:cNvSpPr/>
-          <p:nvPr/>
-        </p:nvSpPr>
-        <p:spPr>
-          <a:xfrm>
-            <a:off x="2057399" y="4592782"/>
-            <a:ext cx="845127" cy="505690"/>
-          </a:xfrm>
-          <a:prstGeom prst="rect">
-            <a:avLst/>
-          </a:prstGeom>
-        </p:spPr>
-        <p:style>
-          <a:lnRef idx="2">
-            <a:schemeClr val="accent1">
-              <a:shade val="50000"/>
-            </a:schemeClr>
-          </a:lnRef>
-          <a:fillRef idx="1">
-            <a:schemeClr val="accent1"/>
-          </a:fillRef>
-          <a:effectRef idx="0">
-            <a:schemeClr val="accent1"/>
-          </a:effectRef>
-          <a:fontRef idx="minor">
-            <a:schemeClr val="lt1"/>
-          </a:fontRef>
-        </p:style>
-        <p:txBody>
-          <a:bodyPr rtlCol="0" anchor="ctr"/>
-          <a:lstStyle/>
-          <a:p>
-            <a:pPr algn="ctr"/>
-            <a:r>
-              <a:rPr lang="fr-FR" sz="1400" dirty="0"/>
-              <a:t>Motors</a:t>
-            </a:r>
-            <a:endParaRPr lang="fr-BE" sz="1400" dirty="0"/>
-          </a:p>
-        </p:txBody>
-      </p:sp>
-      <p:cxnSp>
-        <p:nvCxnSpPr>
-          <p:cNvPr id="18" name="Connecteur droit avec flèche 17">
-            <a:extLst>
-              <a:ext uri="{FF2B5EF4-FFF2-40B4-BE49-F238E27FC236}">
-                <a16:creationId xmlns:a16="http://schemas.microsoft.com/office/drawing/2014/main" id="{5189DAF7-FCE8-4EDE-95A9-6868FE025888}"/>
-              </a:ext>
-            </a:extLst>
-          </p:cNvPr>
-          <p:cNvCxnSpPr>
-            <a:cxnSpLocks/>
-            <a:stCxn id="4" idx="4"/>
-            <a:endCxn id="7" idx="0"/>
-          </p:cNvCxnSpPr>
-          <p:nvPr/>
-        </p:nvCxnSpPr>
-        <p:spPr>
-          <a:xfrm>
-            <a:off x="5874327" y="1697182"/>
-            <a:ext cx="0" cy="533401"/>
-          </a:xfrm>
-          <a:prstGeom prst="straightConnector1">
-            <a:avLst/>
-          </a:prstGeom>
-          <a:ln>
-            <a:tailEnd type="triangle"/>
-          </a:ln>
-        </p:spPr>
-        <p:style>
-          <a:lnRef idx="1">
-            <a:schemeClr val="accent1"/>
-          </a:lnRef>
-          <a:fillRef idx="0">
-            <a:schemeClr val="accent1"/>
-          </a:fillRef>
-          <a:effectRef idx="0">
-            <a:schemeClr val="accent1"/>
-          </a:effectRef>
-          <a:fontRef idx="minor">
-            <a:schemeClr val="tx1"/>
-          </a:fontRef>
-        </p:style>
-      </p:cxnSp>
-      <p:cxnSp>
-        <p:nvCxnSpPr>
-          <p:cNvPr id="20" name="Connecteur droit avec flèche 19">
-            <a:extLst>
-              <a:ext uri="{FF2B5EF4-FFF2-40B4-BE49-F238E27FC236}">
-                <a16:creationId xmlns:a16="http://schemas.microsoft.com/office/drawing/2014/main" id="{533BEA24-1E5F-4C4F-B4CE-64A022904E6C}"/>
-              </a:ext>
-            </a:extLst>
-          </p:cNvPr>
-          <p:cNvCxnSpPr>
-            <a:cxnSpLocks/>
-            <a:stCxn id="4" idx="3"/>
-            <a:endCxn id="8" idx="7"/>
-          </p:cNvCxnSpPr>
-          <p:nvPr/>
-        </p:nvCxnSpPr>
-        <p:spPr>
-          <a:xfrm flipH="1">
-            <a:off x="3410644" y="1500374"/>
-            <a:ext cx="1533002" cy="927017"/>
-          </a:xfrm>
-          <a:prstGeom prst="straightConnector1">
-            <a:avLst/>
-          </a:prstGeom>
-          <a:ln>
-            <a:tailEnd type="triangle"/>
-          </a:ln>
-        </p:spPr>
-        <p:style>
-          <a:lnRef idx="1">
-            <a:schemeClr val="accent1"/>
-          </a:lnRef>
-          <a:fillRef idx="0">
-            <a:schemeClr val="accent1"/>
-          </a:fillRef>
-          <a:effectRef idx="0">
-            <a:schemeClr val="accent1"/>
-          </a:effectRef>
-          <a:fontRef idx="minor">
-            <a:schemeClr val="tx1"/>
-          </a:fontRef>
-        </p:style>
-      </p:cxnSp>
-      <p:cxnSp>
-        <p:nvCxnSpPr>
-          <p:cNvPr id="22" name="Connecteur droit avec flèche 21">
-            <a:extLst>
-              <a:ext uri="{FF2B5EF4-FFF2-40B4-BE49-F238E27FC236}">
-                <a16:creationId xmlns:a16="http://schemas.microsoft.com/office/drawing/2014/main" id="{7BC85C97-04E0-462B-9705-0F414A4759E2}"/>
-              </a:ext>
-            </a:extLst>
-          </p:cNvPr>
-          <p:cNvCxnSpPr>
-            <a:cxnSpLocks/>
-            <a:stCxn id="4" idx="5"/>
-            <a:endCxn id="9" idx="1"/>
-          </p:cNvCxnSpPr>
-          <p:nvPr/>
-        </p:nvCxnSpPr>
-        <p:spPr>
-          <a:xfrm>
-            <a:off x="6805008" y="1500374"/>
-            <a:ext cx="1533002" cy="927017"/>
-          </a:xfrm>
-          <a:prstGeom prst="straightConnector1">
-            <a:avLst/>
-          </a:prstGeom>
-          <a:ln>
-            <a:tailEnd type="triangle"/>
-          </a:ln>
-        </p:spPr>
-        <p:style>
-          <a:lnRef idx="1">
-            <a:schemeClr val="accent1"/>
-          </a:lnRef>
-          <a:fillRef idx="0">
-            <a:schemeClr val="accent1"/>
-          </a:fillRef>
-          <a:effectRef idx="0">
-            <a:schemeClr val="accent1"/>
-          </a:effectRef>
-          <a:fontRef idx="minor">
-            <a:schemeClr val="tx1"/>
-          </a:fontRef>
-        </p:style>
-      </p:cxnSp>
-      <p:cxnSp>
-        <p:nvCxnSpPr>
-          <p:cNvPr id="24" name="Connecteur droit avec flèche 23">
-            <a:extLst>
-              <a:ext uri="{FF2B5EF4-FFF2-40B4-BE49-F238E27FC236}">
-                <a16:creationId xmlns:a16="http://schemas.microsoft.com/office/drawing/2014/main" id="{15352CCE-86B5-4C02-9805-40FB021E88AF}"/>
-              </a:ext>
-            </a:extLst>
-          </p:cNvPr>
-          <p:cNvCxnSpPr>
-            <a:cxnSpLocks/>
-            <a:stCxn id="9" idx="4"/>
-            <a:endCxn id="14" idx="0"/>
-          </p:cNvCxnSpPr>
-          <p:nvPr/>
-        </p:nvCxnSpPr>
-        <p:spPr>
-          <a:xfrm>
-            <a:off x="9268691" y="3574473"/>
-            <a:ext cx="644238" cy="1018309"/>
-          </a:xfrm>
-          <a:prstGeom prst="straightConnector1">
-            <a:avLst/>
-          </a:prstGeom>
-          <a:ln>
-            <a:tailEnd type="triangle"/>
-          </a:ln>
-        </p:spPr>
-        <p:style>
-          <a:lnRef idx="1">
-            <a:schemeClr val="accent1"/>
-          </a:lnRef>
-          <a:fillRef idx="0">
-            <a:schemeClr val="accent1"/>
-          </a:fillRef>
-          <a:effectRef idx="0">
-            <a:schemeClr val="accent1"/>
-          </a:effectRef>
-          <a:fontRef idx="minor">
-            <a:schemeClr val="tx1"/>
-          </a:fontRef>
-        </p:style>
-      </p:cxnSp>
-      <p:cxnSp>
-        <p:nvCxnSpPr>
-          <p:cNvPr id="26" name="Connecteur droit avec flèche 25">
-            <a:extLst>
-              <a:ext uri="{FF2B5EF4-FFF2-40B4-BE49-F238E27FC236}">
-                <a16:creationId xmlns:a16="http://schemas.microsoft.com/office/drawing/2014/main" id="{810E5DBF-9C13-4B31-BC3B-75C50A69398F}"/>
-              </a:ext>
-            </a:extLst>
-          </p:cNvPr>
-          <p:cNvCxnSpPr>
-            <a:cxnSpLocks/>
-            <a:stCxn id="7" idx="4"/>
-            <a:endCxn id="10" idx="0"/>
-          </p:cNvCxnSpPr>
-          <p:nvPr/>
-        </p:nvCxnSpPr>
-        <p:spPr>
-          <a:xfrm>
-            <a:off x="5874327" y="3574473"/>
-            <a:ext cx="0" cy="1018309"/>
-          </a:xfrm>
-          <a:prstGeom prst="straightConnector1">
-            <a:avLst/>
-          </a:prstGeom>
-          <a:ln>
-            <a:tailEnd type="triangle"/>
-          </a:ln>
-        </p:spPr>
-        <p:style>
-          <a:lnRef idx="1">
-            <a:schemeClr val="accent1"/>
-          </a:lnRef>
-          <a:fillRef idx="0">
-            <a:schemeClr val="accent1"/>
-          </a:fillRef>
-          <a:effectRef idx="0">
-            <a:schemeClr val="accent1"/>
-          </a:effectRef>
-          <a:fontRef idx="minor">
-            <a:schemeClr val="tx1"/>
-          </a:fontRef>
-        </p:style>
-      </p:cxnSp>
-      <p:cxnSp>
-        <p:nvCxnSpPr>
-          <p:cNvPr id="30" name="Connecteur droit avec flèche 29">
-            <a:extLst>
-              <a:ext uri="{FF2B5EF4-FFF2-40B4-BE49-F238E27FC236}">
-                <a16:creationId xmlns:a16="http://schemas.microsoft.com/office/drawing/2014/main" id="{E0458F3F-556F-42A9-B4C4-9318CD74988D}"/>
-              </a:ext>
-            </a:extLst>
-          </p:cNvPr>
-          <p:cNvCxnSpPr>
-            <a:cxnSpLocks/>
-            <a:stCxn id="9" idx="4"/>
-            <a:endCxn id="13" idx="0"/>
-          </p:cNvCxnSpPr>
-          <p:nvPr/>
-        </p:nvCxnSpPr>
-        <p:spPr>
-          <a:xfrm flipH="1">
-            <a:off x="8742219" y="3574473"/>
-            <a:ext cx="526472" cy="1018309"/>
-          </a:xfrm>
-          <a:prstGeom prst="straightConnector1">
-            <a:avLst/>
-          </a:prstGeom>
-          <a:ln>
-            <a:tailEnd type="triangle"/>
-          </a:ln>
-        </p:spPr>
-        <p:style>
-          <a:lnRef idx="1">
-            <a:schemeClr val="accent1"/>
-          </a:lnRef>
-          <a:fillRef idx="0">
-            <a:schemeClr val="accent1"/>
-          </a:fillRef>
-          <a:effectRef idx="0">
-            <a:schemeClr val="accent1"/>
-          </a:effectRef>
-          <a:fontRef idx="minor">
-            <a:schemeClr val="tx1"/>
-          </a:fontRef>
-        </p:style>
-      </p:cxnSp>
-      <p:cxnSp>
-        <p:nvCxnSpPr>
-          <p:cNvPr id="31" name="Connecteur droit avec flèche 30">
-            <a:extLst>
-              <a:ext uri="{FF2B5EF4-FFF2-40B4-BE49-F238E27FC236}">
-                <a16:creationId xmlns:a16="http://schemas.microsoft.com/office/drawing/2014/main" id="{643E1064-C887-42B4-9088-6378A1CB7810}"/>
-              </a:ext>
-            </a:extLst>
-          </p:cNvPr>
-          <p:cNvCxnSpPr>
-            <a:cxnSpLocks/>
-            <a:stCxn id="8" idx="4"/>
-            <a:endCxn id="16" idx="0"/>
-          </p:cNvCxnSpPr>
-          <p:nvPr/>
-        </p:nvCxnSpPr>
-        <p:spPr>
-          <a:xfrm>
-            <a:off x="2479963" y="3574473"/>
-            <a:ext cx="0" cy="1018309"/>
-          </a:xfrm>
-          <a:prstGeom prst="straightConnector1">
-            <a:avLst/>
-          </a:prstGeom>
-          <a:ln>
-            <a:tailEnd type="triangle"/>
-          </a:ln>
-        </p:spPr>
-        <p:style>
-          <a:lnRef idx="1">
-            <a:schemeClr val="accent1"/>
-          </a:lnRef>
-          <a:fillRef idx="0">
-            <a:schemeClr val="accent1"/>
-          </a:fillRef>
-          <a:effectRef idx="0">
-            <a:schemeClr val="accent1"/>
-          </a:effectRef>
-          <a:fontRef idx="minor">
-            <a:schemeClr val="tx1"/>
-          </a:fontRef>
-        </p:style>
-      </p:cxnSp>
+        </p:grpSpPr>
+        <p:grpSp>
+          <p:nvGrpSpPr>
+            <p:cNvPr id="12" name="Groupe 11">
+              <a:extLst>
+                <a:ext uri="{FF2B5EF4-FFF2-40B4-BE49-F238E27FC236}">
+                  <a16:creationId xmlns:a16="http://schemas.microsoft.com/office/drawing/2014/main" id="{8AF85CF6-7BAF-44B6-A886-2C606943AF3E}"/>
+                </a:ext>
+              </a:extLst>
+            </p:cNvPr>
+            <p:cNvGrpSpPr/>
+            <p:nvPr/>
+          </p:nvGrpSpPr>
+          <p:grpSpPr>
+            <a:xfrm>
+              <a:off x="2123914" y="3068398"/>
+              <a:ext cx="2491736" cy="1664266"/>
+              <a:chOff x="2077743" y="559482"/>
+              <a:chExt cx="2491736" cy="1664266"/>
+            </a:xfrm>
+          </p:grpSpPr>
+          <p:grpSp>
+            <p:nvGrpSpPr>
+              <p:cNvPr id="2" name="Groupe 1">
+                <a:extLst>
+                  <a:ext uri="{FF2B5EF4-FFF2-40B4-BE49-F238E27FC236}">
+                    <a16:creationId xmlns:a16="http://schemas.microsoft.com/office/drawing/2014/main" id="{7DE18566-2034-456C-9FE7-07D15239C2B8}"/>
+                  </a:ext>
+                </a:extLst>
+              </p:cNvPr>
+              <p:cNvGrpSpPr/>
+              <p:nvPr/>
+            </p:nvGrpSpPr>
+            <p:grpSpPr>
+              <a:xfrm>
+                <a:off x="2077743" y="1150727"/>
+                <a:ext cx="2491736" cy="1073021"/>
+                <a:chOff x="3535148" y="1157803"/>
+                <a:chExt cx="5189527" cy="2112124"/>
+              </a:xfrm>
+            </p:grpSpPr>
+            <p:sp>
+              <p:nvSpPr>
+                <p:cNvPr id="10" name="Rectangle 9">
+                  <a:extLst>
+                    <a:ext uri="{FF2B5EF4-FFF2-40B4-BE49-F238E27FC236}">
+                      <a16:creationId xmlns:a16="http://schemas.microsoft.com/office/drawing/2014/main" id="{E8C1C5D9-82EA-46AF-9A6F-2A24DF989145}"/>
+                    </a:ext>
+                  </a:extLst>
+                </p:cNvPr>
+                <p:cNvSpPr/>
+                <p:nvPr/>
+              </p:nvSpPr>
+              <p:spPr>
+                <a:xfrm>
+                  <a:off x="5364311" y="2764238"/>
+                  <a:ext cx="1034683" cy="505689"/>
+                </a:xfrm>
+                <a:prstGeom prst="rect">
+                  <a:avLst/>
+                </a:prstGeom>
+                <a:ln w="6350"/>
+              </p:spPr>
+              <p:style>
+                <a:lnRef idx="2">
+                  <a:schemeClr val="dk1"/>
+                </a:lnRef>
+                <a:fillRef idx="1">
+                  <a:schemeClr val="lt1"/>
+                </a:fillRef>
+                <a:effectRef idx="0">
+                  <a:schemeClr val="dk1"/>
+                </a:effectRef>
+                <a:fontRef idx="minor">
+                  <a:schemeClr val="dk1"/>
+                </a:fontRef>
+              </p:style>
+              <p:txBody>
+                <a:bodyPr rtlCol="0" anchor="ctr"/>
+                <a:lstStyle/>
+                <a:p>
+                  <a:pPr algn="ctr"/>
+                  <a:r>
+                    <a:rPr lang="fr-FR" sz="700" dirty="0"/>
+                    <a:t>Motors</a:t>
+                  </a:r>
+                  <a:endParaRPr lang="fr-BE" sz="700" dirty="0"/>
+                </a:p>
+              </p:txBody>
+            </p:sp>
+            <p:sp>
+              <p:nvSpPr>
+                <p:cNvPr id="13" name="Rectangle 12">
+                  <a:extLst>
+                    <a:ext uri="{FF2B5EF4-FFF2-40B4-BE49-F238E27FC236}">
+                      <a16:creationId xmlns:a16="http://schemas.microsoft.com/office/drawing/2014/main" id="{405FA1C5-E5D1-46AF-9069-3914F77671DD}"/>
+                    </a:ext>
+                  </a:extLst>
+                </p:cNvPr>
+                <p:cNvSpPr/>
+                <p:nvPr/>
+              </p:nvSpPr>
+              <p:spPr>
+                <a:xfrm>
+                  <a:off x="6768204" y="2755785"/>
+                  <a:ext cx="819316" cy="505689"/>
+                </a:xfrm>
+                <a:prstGeom prst="rect">
+                  <a:avLst/>
+                </a:prstGeom>
+                <a:ln w="6350"/>
+              </p:spPr>
+              <p:style>
+                <a:lnRef idx="2">
+                  <a:schemeClr val="dk1"/>
+                </a:lnRef>
+                <a:fillRef idx="1">
+                  <a:schemeClr val="lt1"/>
+                </a:fillRef>
+                <a:effectRef idx="0">
+                  <a:schemeClr val="dk1"/>
+                </a:effectRef>
+                <a:fontRef idx="minor">
+                  <a:schemeClr val="dk1"/>
+                </a:fontRef>
+              </p:style>
+              <p:txBody>
+                <a:bodyPr rtlCol="0" anchor="ctr"/>
+                <a:lstStyle/>
+                <a:p>
+                  <a:pPr algn="ctr"/>
+                  <a:r>
+                    <a:rPr lang="fr-FR" sz="700" dirty="0"/>
+                    <a:t>Lidar</a:t>
+                  </a:r>
+                  <a:endParaRPr lang="fr-BE" sz="700" dirty="0"/>
+                </a:p>
+              </p:txBody>
+            </p:sp>
+            <p:sp>
+              <p:nvSpPr>
+                <p:cNvPr id="14" name="Rectangle 13">
+                  <a:extLst>
+                    <a:ext uri="{FF2B5EF4-FFF2-40B4-BE49-F238E27FC236}">
+                      <a16:creationId xmlns:a16="http://schemas.microsoft.com/office/drawing/2014/main" id="{D9FB9FEC-F0DA-4B5A-82D3-4B1B6E98DB24}"/>
+                    </a:ext>
+                  </a:extLst>
+                </p:cNvPr>
+                <p:cNvSpPr/>
+                <p:nvPr/>
+              </p:nvSpPr>
+              <p:spPr>
+                <a:xfrm>
+                  <a:off x="7723548" y="2755785"/>
+                  <a:ext cx="1001127" cy="505689"/>
+                </a:xfrm>
+                <a:prstGeom prst="rect">
+                  <a:avLst/>
+                </a:prstGeom>
+                <a:ln w="6350"/>
+              </p:spPr>
+              <p:style>
+                <a:lnRef idx="2">
+                  <a:schemeClr val="dk1"/>
+                </a:lnRef>
+                <a:fillRef idx="1">
+                  <a:schemeClr val="lt1"/>
+                </a:fillRef>
+                <a:effectRef idx="0">
+                  <a:schemeClr val="dk1"/>
+                </a:effectRef>
+                <a:fontRef idx="minor">
+                  <a:schemeClr val="dk1"/>
+                </a:fontRef>
+              </p:style>
+              <p:txBody>
+                <a:bodyPr rtlCol="0" anchor="ctr"/>
+                <a:lstStyle/>
+                <a:p>
+                  <a:pPr algn="ctr"/>
+                  <a:r>
+                    <a:rPr lang="fr-FR" sz="700" dirty="0"/>
+                    <a:t>Buttons</a:t>
+                  </a:r>
+                  <a:endParaRPr lang="fr-BE" sz="700" dirty="0"/>
+                </a:p>
+              </p:txBody>
+            </p:sp>
+            <p:sp>
+              <p:nvSpPr>
+                <p:cNvPr id="16" name="Rectangle 15">
+                  <a:extLst>
+                    <a:ext uri="{FF2B5EF4-FFF2-40B4-BE49-F238E27FC236}">
+                      <a16:creationId xmlns:a16="http://schemas.microsoft.com/office/drawing/2014/main" id="{46001A5C-5BB2-4897-8A65-1A707164C543}"/>
+                    </a:ext>
+                  </a:extLst>
+                </p:cNvPr>
+                <p:cNvSpPr/>
+                <p:nvPr/>
+              </p:nvSpPr>
+              <p:spPr>
+                <a:xfrm>
+                  <a:off x="3535148" y="2755786"/>
+                  <a:ext cx="1034683" cy="505689"/>
+                </a:xfrm>
+                <a:prstGeom prst="rect">
+                  <a:avLst/>
+                </a:prstGeom>
+                <a:ln w="6350"/>
+              </p:spPr>
+              <p:style>
+                <a:lnRef idx="2">
+                  <a:schemeClr val="dk1"/>
+                </a:lnRef>
+                <a:fillRef idx="1">
+                  <a:schemeClr val="lt1"/>
+                </a:fillRef>
+                <a:effectRef idx="0">
+                  <a:schemeClr val="dk1"/>
+                </a:effectRef>
+                <a:fontRef idx="minor">
+                  <a:schemeClr val="dk1"/>
+                </a:fontRef>
+              </p:style>
+              <p:txBody>
+                <a:bodyPr rtlCol="0" anchor="ctr"/>
+                <a:lstStyle/>
+                <a:p>
+                  <a:pPr algn="ctr"/>
+                  <a:r>
+                    <a:rPr lang="fr-FR" sz="700" dirty="0"/>
+                    <a:t>Motors</a:t>
+                  </a:r>
+                  <a:endParaRPr lang="fr-BE" sz="700" dirty="0"/>
+                </a:p>
+              </p:txBody>
+            </p:sp>
+            <p:cxnSp>
+              <p:nvCxnSpPr>
+                <p:cNvPr id="18" name="Connecteur droit avec flèche 17">
+                  <a:extLst>
+                    <a:ext uri="{FF2B5EF4-FFF2-40B4-BE49-F238E27FC236}">
+                      <a16:creationId xmlns:a16="http://schemas.microsoft.com/office/drawing/2014/main" id="{5189DAF7-FCE8-4EDE-95A9-6868FE025888}"/>
+                    </a:ext>
+                  </a:extLst>
+                </p:cNvPr>
+                <p:cNvCxnSpPr>
+                  <a:cxnSpLocks/>
+                  <a:stCxn id="40" idx="2"/>
+                  <a:endCxn id="48" idx="0"/>
+                </p:cNvCxnSpPr>
+                <p:nvPr/>
+              </p:nvCxnSpPr>
+              <p:spPr>
+                <a:xfrm flipH="1">
+                  <a:off x="5867509" y="1157803"/>
+                  <a:ext cx="6819" cy="552185"/>
+                </a:xfrm>
+                <a:prstGeom prst="straightConnector1">
+                  <a:avLst/>
+                </a:prstGeom>
+                <a:ln w="6350">
+                  <a:tailEnd type="triangle"/>
+                </a:ln>
+              </p:spPr>
+              <p:style>
+                <a:lnRef idx="2">
+                  <a:schemeClr val="dk1"/>
+                </a:lnRef>
+                <a:fillRef idx="1">
+                  <a:schemeClr val="lt1"/>
+                </a:fillRef>
+                <a:effectRef idx="0">
+                  <a:schemeClr val="dk1"/>
+                </a:effectRef>
+                <a:fontRef idx="minor">
+                  <a:schemeClr val="dk1"/>
+                </a:fontRef>
+              </p:style>
+            </p:cxnSp>
+            <p:cxnSp>
+              <p:nvCxnSpPr>
+                <p:cNvPr id="20" name="Connecteur droit avec flèche 19">
+                  <a:extLst>
+                    <a:ext uri="{FF2B5EF4-FFF2-40B4-BE49-F238E27FC236}">
+                      <a16:creationId xmlns:a16="http://schemas.microsoft.com/office/drawing/2014/main" id="{533BEA24-1E5F-4C4F-B4CE-64A022904E6C}"/>
+                    </a:ext>
+                  </a:extLst>
+                </p:cNvPr>
+                <p:cNvCxnSpPr>
+                  <a:cxnSpLocks/>
+                  <a:stCxn id="40" idx="2"/>
+                  <a:endCxn id="50" idx="0"/>
+                </p:cNvCxnSpPr>
+                <p:nvPr/>
+              </p:nvCxnSpPr>
+              <p:spPr>
+                <a:xfrm flipH="1">
+                  <a:off x="4045523" y="1157803"/>
+                  <a:ext cx="1828804" cy="552185"/>
+                </a:xfrm>
+                <a:prstGeom prst="straightConnector1">
+                  <a:avLst/>
+                </a:prstGeom>
+                <a:ln w="6350">
+                  <a:tailEnd type="triangle"/>
+                </a:ln>
+              </p:spPr>
+              <p:style>
+                <a:lnRef idx="2">
+                  <a:schemeClr val="dk1"/>
+                </a:lnRef>
+                <a:fillRef idx="1">
+                  <a:schemeClr val="lt1"/>
+                </a:fillRef>
+                <a:effectRef idx="0">
+                  <a:schemeClr val="dk1"/>
+                </a:effectRef>
+                <a:fontRef idx="minor">
+                  <a:schemeClr val="dk1"/>
+                </a:fontRef>
+              </p:style>
+            </p:cxnSp>
+            <p:cxnSp>
+              <p:nvCxnSpPr>
+                <p:cNvPr id="22" name="Connecteur droit avec flèche 21">
+                  <a:extLst>
+                    <a:ext uri="{FF2B5EF4-FFF2-40B4-BE49-F238E27FC236}">
+                      <a16:creationId xmlns:a16="http://schemas.microsoft.com/office/drawing/2014/main" id="{7BC85C97-04E0-462B-9705-0F414A4759E2}"/>
+                    </a:ext>
+                  </a:extLst>
+                </p:cNvPr>
+                <p:cNvCxnSpPr>
+                  <a:cxnSpLocks/>
+                  <a:stCxn id="40" idx="2"/>
+                  <a:endCxn id="49" idx="0"/>
+                </p:cNvCxnSpPr>
+                <p:nvPr/>
+              </p:nvCxnSpPr>
+              <p:spPr>
+                <a:xfrm>
+                  <a:off x="5874327" y="1157803"/>
+                  <a:ext cx="1778420" cy="531156"/>
+                </a:xfrm>
+                <a:prstGeom prst="straightConnector1">
+                  <a:avLst/>
+                </a:prstGeom>
+                <a:ln w="6350">
+                  <a:tailEnd type="triangle"/>
+                </a:ln>
+              </p:spPr>
+              <p:style>
+                <a:lnRef idx="2">
+                  <a:schemeClr val="dk1"/>
+                </a:lnRef>
+                <a:fillRef idx="1">
+                  <a:schemeClr val="lt1"/>
+                </a:fillRef>
+                <a:effectRef idx="0">
+                  <a:schemeClr val="dk1"/>
+                </a:effectRef>
+                <a:fontRef idx="minor">
+                  <a:schemeClr val="dk1"/>
+                </a:fontRef>
+              </p:style>
+            </p:cxnSp>
+            <p:cxnSp>
+              <p:nvCxnSpPr>
+                <p:cNvPr id="24" name="Connecteur droit avec flèche 23">
+                  <a:extLst>
+                    <a:ext uri="{FF2B5EF4-FFF2-40B4-BE49-F238E27FC236}">
+                      <a16:creationId xmlns:a16="http://schemas.microsoft.com/office/drawing/2014/main" id="{15352CCE-86B5-4C02-9805-40FB021E88AF}"/>
+                    </a:ext>
+                  </a:extLst>
+                </p:cNvPr>
+                <p:cNvCxnSpPr>
+                  <a:cxnSpLocks/>
+                  <a:stCxn id="49" idx="2"/>
+                  <a:endCxn id="14" idx="0"/>
+                </p:cNvCxnSpPr>
+                <p:nvPr/>
+              </p:nvCxnSpPr>
+              <p:spPr>
+                <a:xfrm>
+                  <a:off x="7652747" y="2233081"/>
+                  <a:ext cx="571365" cy="522704"/>
+                </a:xfrm>
+                <a:prstGeom prst="straightConnector1">
+                  <a:avLst/>
+                </a:prstGeom>
+                <a:ln w="6350">
+                  <a:tailEnd type="triangle"/>
+                </a:ln>
+              </p:spPr>
+              <p:style>
+                <a:lnRef idx="2">
+                  <a:schemeClr val="dk1"/>
+                </a:lnRef>
+                <a:fillRef idx="1">
+                  <a:schemeClr val="lt1"/>
+                </a:fillRef>
+                <a:effectRef idx="0">
+                  <a:schemeClr val="dk1"/>
+                </a:effectRef>
+                <a:fontRef idx="minor">
+                  <a:schemeClr val="dk1"/>
+                </a:fontRef>
+              </p:style>
+            </p:cxnSp>
+            <p:cxnSp>
+              <p:nvCxnSpPr>
+                <p:cNvPr id="26" name="Connecteur droit avec flèche 25">
+                  <a:extLst>
+                    <a:ext uri="{FF2B5EF4-FFF2-40B4-BE49-F238E27FC236}">
+                      <a16:creationId xmlns:a16="http://schemas.microsoft.com/office/drawing/2014/main" id="{810E5DBF-9C13-4B31-BC3B-75C50A69398F}"/>
+                    </a:ext>
+                  </a:extLst>
+                </p:cNvPr>
+                <p:cNvCxnSpPr>
+                  <a:cxnSpLocks/>
+                  <a:stCxn id="48" idx="2"/>
+                  <a:endCxn id="10" idx="0"/>
+                </p:cNvCxnSpPr>
+                <p:nvPr/>
+              </p:nvCxnSpPr>
+              <p:spPr>
+                <a:xfrm>
+                  <a:off x="5867509" y="2254110"/>
+                  <a:ext cx="14144" cy="510128"/>
+                </a:xfrm>
+                <a:prstGeom prst="straightConnector1">
+                  <a:avLst/>
+                </a:prstGeom>
+                <a:ln w="6350">
+                  <a:tailEnd type="triangle"/>
+                </a:ln>
+              </p:spPr>
+              <p:style>
+                <a:lnRef idx="2">
+                  <a:schemeClr val="dk1"/>
+                </a:lnRef>
+                <a:fillRef idx="1">
+                  <a:schemeClr val="lt1"/>
+                </a:fillRef>
+                <a:effectRef idx="0">
+                  <a:schemeClr val="dk1"/>
+                </a:effectRef>
+                <a:fontRef idx="minor">
+                  <a:schemeClr val="dk1"/>
+                </a:fontRef>
+              </p:style>
+            </p:cxnSp>
+            <p:cxnSp>
+              <p:nvCxnSpPr>
+                <p:cNvPr id="30" name="Connecteur droit avec flèche 29">
+                  <a:extLst>
+                    <a:ext uri="{FF2B5EF4-FFF2-40B4-BE49-F238E27FC236}">
+                      <a16:creationId xmlns:a16="http://schemas.microsoft.com/office/drawing/2014/main" id="{E0458F3F-556F-42A9-B4C4-9318CD74988D}"/>
+                    </a:ext>
+                  </a:extLst>
+                </p:cNvPr>
+                <p:cNvCxnSpPr>
+                  <a:cxnSpLocks/>
+                  <a:stCxn id="49" idx="2"/>
+                  <a:endCxn id="13" idx="0"/>
+                </p:cNvCxnSpPr>
+                <p:nvPr/>
+              </p:nvCxnSpPr>
+              <p:spPr>
+                <a:xfrm flipH="1">
+                  <a:off x="7177861" y="2233081"/>
+                  <a:ext cx="474886" cy="522704"/>
+                </a:xfrm>
+                <a:prstGeom prst="straightConnector1">
+                  <a:avLst/>
+                </a:prstGeom>
+                <a:ln w="6350">
+                  <a:tailEnd type="triangle"/>
+                </a:ln>
+              </p:spPr>
+              <p:style>
+                <a:lnRef idx="2">
+                  <a:schemeClr val="dk1"/>
+                </a:lnRef>
+                <a:fillRef idx="1">
+                  <a:schemeClr val="lt1"/>
+                </a:fillRef>
+                <a:effectRef idx="0">
+                  <a:schemeClr val="dk1"/>
+                </a:effectRef>
+                <a:fontRef idx="minor">
+                  <a:schemeClr val="dk1"/>
+                </a:fontRef>
+              </p:style>
+            </p:cxnSp>
+            <p:cxnSp>
+              <p:nvCxnSpPr>
+                <p:cNvPr id="31" name="Connecteur droit avec flèche 30">
+                  <a:extLst>
+                    <a:ext uri="{FF2B5EF4-FFF2-40B4-BE49-F238E27FC236}">
+                      <a16:creationId xmlns:a16="http://schemas.microsoft.com/office/drawing/2014/main" id="{643E1064-C887-42B4-9088-6378A1CB7810}"/>
+                    </a:ext>
+                  </a:extLst>
+                </p:cNvPr>
+                <p:cNvCxnSpPr>
+                  <a:cxnSpLocks/>
+                  <a:stCxn id="50" idx="2"/>
+                  <a:endCxn id="16" idx="0"/>
+                </p:cNvCxnSpPr>
+                <p:nvPr/>
+              </p:nvCxnSpPr>
+              <p:spPr>
+                <a:xfrm>
+                  <a:off x="4045523" y="2254110"/>
+                  <a:ext cx="6967" cy="501676"/>
+                </a:xfrm>
+                <a:prstGeom prst="straightConnector1">
+                  <a:avLst/>
+                </a:prstGeom>
+                <a:ln w="6350">
+                  <a:tailEnd type="triangle"/>
+                </a:ln>
+              </p:spPr>
+              <p:style>
+                <a:lnRef idx="2">
+                  <a:schemeClr val="dk1"/>
+                </a:lnRef>
+                <a:fillRef idx="1">
+                  <a:schemeClr val="lt1"/>
+                </a:fillRef>
+                <a:effectRef idx="0">
+                  <a:schemeClr val="dk1"/>
+                </a:effectRef>
+                <a:fontRef idx="minor">
+                  <a:schemeClr val="dk1"/>
+                </a:fontRef>
+              </p:style>
+            </p:cxnSp>
+          </p:grpSp>
+          <p:sp>
+            <p:nvSpPr>
+              <p:cNvPr id="11" name="ZoneTexte 10">
+                <a:extLst>
+                  <a:ext uri="{FF2B5EF4-FFF2-40B4-BE49-F238E27FC236}">
+                    <a16:creationId xmlns:a16="http://schemas.microsoft.com/office/drawing/2014/main" id="{B8045A42-73DF-4537-877F-5A6BDFD2456F}"/>
+                  </a:ext>
+                </a:extLst>
+              </p:cNvPr>
+              <p:cNvSpPr txBox="1"/>
+              <p:nvPr/>
+            </p:nvSpPr>
+            <p:spPr>
+              <a:xfrm>
+                <a:off x="2525152" y="559482"/>
+                <a:ext cx="1680302" cy="307777"/>
+              </a:xfrm>
+              <a:prstGeom prst="rect">
+                <a:avLst/>
+              </a:prstGeom>
+              <a:noFill/>
+              <a:ln w="6350">
+                <a:noFill/>
+              </a:ln>
+            </p:spPr>
+            <p:txBody>
+              <a:bodyPr wrap="square" rtlCol="0">
+                <a:spAutoFit/>
+              </a:bodyPr>
+              <a:lstStyle/>
+              <a:p>
+                <a:r>
+                  <a:rPr lang="fr-FR" sz="1400" dirty="0"/>
+                  <a:t>Class : </a:t>
+                </a:r>
+                <a:r>
+                  <a:rPr lang="fr-FR" sz="1400" i="1" dirty="0" err="1">
+                    <a:solidFill>
+                      <a:schemeClr val="accent6"/>
+                    </a:solidFill>
+                  </a:rPr>
+                  <a:t>MyRobot</a:t>
+                </a:r>
+                <a:endParaRPr lang="fr-BE" sz="1400" i="1" dirty="0">
+                  <a:solidFill>
+                    <a:schemeClr val="accent6"/>
+                  </a:solidFill>
+                </a:endParaRPr>
+              </a:p>
+            </p:txBody>
+          </p:sp>
+        </p:grpSp>
+        <p:sp>
+          <p:nvSpPr>
+            <p:cNvPr id="15" name="Rectangle : coins arrondis 14">
+              <a:extLst>
+                <a:ext uri="{FF2B5EF4-FFF2-40B4-BE49-F238E27FC236}">
+                  <a16:creationId xmlns:a16="http://schemas.microsoft.com/office/drawing/2014/main" id="{5E30BBB7-4179-4BB6-A46E-3E6473079811}"/>
+                </a:ext>
+              </a:extLst>
+            </p:cNvPr>
+            <p:cNvSpPr/>
+            <p:nvPr/>
+          </p:nvSpPr>
+          <p:spPr>
+            <a:xfrm>
+              <a:off x="1819987" y="3068398"/>
+              <a:ext cx="2983043" cy="1861997"/>
+            </a:xfrm>
+            <a:prstGeom prst="roundRect">
+              <a:avLst/>
+            </a:prstGeom>
+            <a:noFill/>
+            <a:ln w="6350">
+              <a:solidFill>
+                <a:srgbClr val="002060"/>
+              </a:solidFill>
+              <a:prstDash val="lgDash"/>
+            </a:ln>
+          </p:spPr>
+          <p:style>
+            <a:lnRef idx="2">
+              <a:schemeClr val="accent1"/>
+            </a:lnRef>
+            <a:fillRef idx="1">
+              <a:schemeClr val="lt1"/>
+            </a:fillRef>
+            <a:effectRef idx="0">
+              <a:schemeClr val="accent1"/>
+            </a:effectRef>
+            <a:fontRef idx="minor">
+              <a:schemeClr val="dk1"/>
+            </a:fontRef>
+          </p:style>
+          <p:txBody>
+            <a:bodyPr rtlCol="0" anchor="ctr"/>
+            <a:lstStyle/>
+            <a:p>
+              <a:pPr algn="ctr"/>
+              <a:endParaRPr lang="fr-BE"/>
+            </a:p>
+          </p:txBody>
+        </p:sp>
+        <p:sp>
+          <p:nvSpPr>
+            <p:cNvPr id="40" name="Rectangle 39">
+              <a:extLst>
+                <a:ext uri="{FF2B5EF4-FFF2-40B4-BE49-F238E27FC236}">
+                  <a16:creationId xmlns:a16="http://schemas.microsoft.com/office/drawing/2014/main" id="{2D947873-5BBB-41F3-A3E5-C20BD9E9C443}"/>
+                </a:ext>
+              </a:extLst>
+            </p:cNvPr>
+            <p:cNvSpPr/>
+            <p:nvPr/>
+          </p:nvSpPr>
+          <p:spPr>
+            <a:xfrm>
+              <a:off x="2841093" y="3383213"/>
+              <a:ext cx="811941" cy="276430"/>
+            </a:xfrm>
+            <a:prstGeom prst="rect">
+              <a:avLst/>
+            </a:prstGeom>
+            <a:noFill/>
+            <a:ln w="6350">
+              <a:solidFill>
+                <a:schemeClr val="tx1"/>
+              </a:solidFill>
+            </a:ln>
+          </p:spPr>
+          <p:style>
+            <a:lnRef idx="2">
+              <a:schemeClr val="accent1">
+                <a:shade val="50000"/>
+              </a:schemeClr>
+            </a:lnRef>
+            <a:fillRef idx="1">
+              <a:schemeClr val="accent1"/>
+            </a:fillRef>
+            <a:effectRef idx="0">
+              <a:schemeClr val="accent1"/>
+            </a:effectRef>
+            <a:fontRef idx="minor">
+              <a:schemeClr val="lt1"/>
+            </a:fontRef>
+          </p:style>
+          <p:txBody>
+            <a:bodyPr rtlCol="0" anchor="ctr"/>
+            <a:lstStyle/>
+            <a:p>
+              <a:pPr algn="ctr"/>
+              <a:r>
+                <a:rPr lang="fr-FR" sz="800" dirty="0" err="1">
+                  <a:solidFill>
+                    <a:schemeClr val="accent6"/>
+                  </a:solidFill>
+                </a:rPr>
+                <a:t>MyRobot</a:t>
+              </a:r>
+              <a:endParaRPr lang="fr-BE" sz="800" dirty="0">
+                <a:solidFill>
+                  <a:schemeClr val="accent6"/>
+                </a:solidFill>
+              </a:endParaRPr>
+            </a:p>
+          </p:txBody>
+        </p:sp>
+        <p:sp>
+          <p:nvSpPr>
+            <p:cNvPr id="48" name="Rectangle 47">
+              <a:extLst>
+                <a:ext uri="{FF2B5EF4-FFF2-40B4-BE49-F238E27FC236}">
+                  <a16:creationId xmlns:a16="http://schemas.microsoft.com/office/drawing/2014/main" id="{3EE2C901-9053-49AC-8B34-DB2BC27DC605}"/>
+                </a:ext>
+              </a:extLst>
+            </p:cNvPr>
+            <p:cNvSpPr/>
+            <p:nvPr/>
+          </p:nvSpPr>
+          <p:spPr>
+            <a:xfrm>
+              <a:off x="2837819" y="3940169"/>
+              <a:ext cx="811941" cy="276430"/>
+            </a:xfrm>
+            <a:prstGeom prst="rect">
+              <a:avLst/>
+            </a:prstGeom>
+            <a:noFill/>
+            <a:ln w="6350">
+              <a:solidFill>
+                <a:schemeClr val="tx1"/>
+              </a:solidFill>
+            </a:ln>
+          </p:spPr>
+          <p:style>
+            <a:lnRef idx="2">
+              <a:schemeClr val="accent1">
+                <a:shade val="50000"/>
+              </a:schemeClr>
+            </a:lnRef>
+            <a:fillRef idx="1">
+              <a:schemeClr val="accent1"/>
+            </a:fillRef>
+            <a:effectRef idx="0">
+              <a:schemeClr val="accent1"/>
+            </a:effectRef>
+            <a:fontRef idx="minor">
+              <a:schemeClr val="lt1"/>
+            </a:fontRef>
+          </p:style>
+          <p:txBody>
+            <a:bodyPr rtlCol="0" anchor="ctr"/>
+            <a:lstStyle/>
+            <a:p>
+              <a:pPr algn="ctr"/>
+              <a:r>
+                <a:rPr lang="fr-FR" sz="800" dirty="0" err="1">
+                  <a:solidFill>
+                    <a:schemeClr val="tx1"/>
+                  </a:solidFill>
+                </a:rPr>
+                <a:t>Actuators</a:t>
+              </a:r>
+              <a:endParaRPr lang="fr-BE" sz="800" dirty="0">
+                <a:solidFill>
+                  <a:schemeClr val="tx1"/>
+                </a:solidFill>
+              </a:endParaRPr>
+            </a:p>
+          </p:txBody>
+        </p:sp>
+        <p:sp>
+          <p:nvSpPr>
+            <p:cNvPr id="49" name="Rectangle 48">
+              <a:extLst>
+                <a:ext uri="{FF2B5EF4-FFF2-40B4-BE49-F238E27FC236}">
+                  <a16:creationId xmlns:a16="http://schemas.microsoft.com/office/drawing/2014/main" id="{31D9AF1C-F3B1-47A5-A0F1-D18EBE02FB5E}"/>
+                </a:ext>
+              </a:extLst>
+            </p:cNvPr>
+            <p:cNvSpPr/>
+            <p:nvPr/>
+          </p:nvSpPr>
+          <p:spPr>
+            <a:xfrm>
+              <a:off x="3694996" y="3929486"/>
+              <a:ext cx="811941" cy="276430"/>
+            </a:xfrm>
+            <a:prstGeom prst="rect">
+              <a:avLst/>
+            </a:prstGeom>
+            <a:noFill/>
+            <a:ln w="6350">
+              <a:solidFill>
+                <a:schemeClr val="tx1"/>
+              </a:solidFill>
+            </a:ln>
+          </p:spPr>
+          <p:style>
+            <a:lnRef idx="2">
+              <a:schemeClr val="accent1">
+                <a:shade val="50000"/>
+              </a:schemeClr>
+            </a:lnRef>
+            <a:fillRef idx="1">
+              <a:schemeClr val="accent1"/>
+            </a:fillRef>
+            <a:effectRef idx="0">
+              <a:schemeClr val="accent1"/>
+            </a:effectRef>
+            <a:fontRef idx="minor">
+              <a:schemeClr val="lt1"/>
+            </a:fontRef>
+          </p:style>
+          <p:txBody>
+            <a:bodyPr rtlCol="0" anchor="ctr"/>
+            <a:lstStyle/>
+            <a:p>
+              <a:pPr algn="ctr"/>
+              <a:r>
+                <a:rPr lang="fr-FR" sz="800" dirty="0" err="1">
+                  <a:solidFill>
+                    <a:schemeClr val="tx1"/>
+                  </a:solidFill>
+                </a:rPr>
+                <a:t>Sensors</a:t>
+              </a:r>
+              <a:endParaRPr lang="fr-BE" sz="800" dirty="0">
+                <a:solidFill>
+                  <a:schemeClr val="tx1"/>
+                </a:solidFill>
+              </a:endParaRPr>
+            </a:p>
+          </p:txBody>
+        </p:sp>
+        <p:sp>
+          <p:nvSpPr>
+            <p:cNvPr id="50" name="Rectangle 49">
+              <a:extLst>
+                <a:ext uri="{FF2B5EF4-FFF2-40B4-BE49-F238E27FC236}">
+                  <a16:creationId xmlns:a16="http://schemas.microsoft.com/office/drawing/2014/main" id="{4C9B7C03-18BB-4DE9-A8E5-999E75F00EF2}"/>
+                </a:ext>
+              </a:extLst>
+            </p:cNvPr>
+            <p:cNvSpPr/>
+            <p:nvPr/>
+          </p:nvSpPr>
+          <p:spPr>
+            <a:xfrm>
+              <a:off x="1962998" y="3940169"/>
+              <a:ext cx="811941" cy="276430"/>
+            </a:xfrm>
+            <a:prstGeom prst="rect">
+              <a:avLst/>
+            </a:prstGeom>
+            <a:noFill/>
+            <a:ln w="6350">
+              <a:solidFill>
+                <a:schemeClr val="tx1"/>
+              </a:solidFill>
+            </a:ln>
+          </p:spPr>
+          <p:style>
+            <a:lnRef idx="2">
+              <a:schemeClr val="accent1">
+                <a:shade val="50000"/>
+              </a:schemeClr>
+            </a:lnRef>
+            <a:fillRef idx="1">
+              <a:schemeClr val="accent1"/>
+            </a:fillRef>
+            <a:effectRef idx="0">
+              <a:schemeClr val="accent1"/>
+            </a:effectRef>
+            <a:fontRef idx="minor">
+              <a:schemeClr val="lt1"/>
+            </a:fontRef>
+          </p:style>
+          <p:txBody>
+            <a:bodyPr rtlCol="0" anchor="ctr"/>
+            <a:lstStyle/>
+            <a:p>
+              <a:pPr algn="ctr"/>
+              <a:r>
+                <a:rPr lang="fr-FR" sz="800" dirty="0">
+                  <a:solidFill>
+                    <a:schemeClr val="tx1"/>
+                  </a:solidFill>
+                </a:rPr>
+                <a:t>State</a:t>
+              </a:r>
+              <a:endParaRPr lang="fr-BE" sz="800" dirty="0">
+                <a:solidFill>
+                  <a:schemeClr val="tx1"/>
+                </a:solidFill>
+              </a:endParaRPr>
+            </a:p>
+          </p:txBody>
+        </p:sp>
+      </p:grpSp>
     </p:spTree>
     <p:extLst>
       <p:ext uri="{BB962C8B-B14F-4D97-AF65-F5344CB8AC3E}">

</xml_diff>

<commit_message>
changes at the faraday + debug
</commit_message>
<xml_diff>
--- a/schemeofcode.pptx
+++ b/schemeofcode.pptx
@@ -262,7 +262,7 @@
           <a:p>
             <a:fld id="{7A3C3441-2C70-4949-8FF7-1C72443CF9D3}" type="datetimeFigureOut">
               <a:rPr lang="fr-BE" smtClean="0"/>
-              <a:t>29-11-21</a:t>
+              <a:t>01-12-21</a:t>
             </a:fld>
             <a:endParaRPr lang="fr-BE"/>
           </a:p>
@@ -462,7 +462,7 @@
           <a:p>
             <a:fld id="{7A3C3441-2C70-4949-8FF7-1C72443CF9D3}" type="datetimeFigureOut">
               <a:rPr lang="fr-BE" smtClean="0"/>
-              <a:t>29-11-21</a:t>
+              <a:t>01-12-21</a:t>
             </a:fld>
             <a:endParaRPr lang="fr-BE"/>
           </a:p>
@@ -672,7 +672,7 @@
           <a:p>
             <a:fld id="{7A3C3441-2C70-4949-8FF7-1C72443CF9D3}" type="datetimeFigureOut">
               <a:rPr lang="fr-BE" smtClean="0"/>
-              <a:t>29-11-21</a:t>
+              <a:t>01-12-21</a:t>
             </a:fld>
             <a:endParaRPr lang="fr-BE"/>
           </a:p>
@@ -872,7 +872,7 @@
           <a:p>
             <a:fld id="{7A3C3441-2C70-4949-8FF7-1C72443CF9D3}" type="datetimeFigureOut">
               <a:rPr lang="fr-BE" smtClean="0"/>
-              <a:t>29-11-21</a:t>
+              <a:t>01-12-21</a:t>
             </a:fld>
             <a:endParaRPr lang="fr-BE"/>
           </a:p>
@@ -1148,7 +1148,7 @@
           <a:p>
             <a:fld id="{7A3C3441-2C70-4949-8FF7-1C72443CF9D3}" type="datetimeFigureOut">
               <a:rPr lang="fr-BE" smtClean="0"/>
-              <a:t>29-11-21</a:t>
+              <a:t>01-12-21</a:t>
             </a:fld>
             <a:endParaRPr lang="fr-BE"/>
           </a:p>
@@ -1416,7 +1416,7 @@
           <a:p>
             <a:fld id="{7A3C3441-2C70-4949-8FF7-1C72443CF9D3}" type="datetimeFigureOut">
               <a:rPr lang="fr-BE" smtClean="0"/>
-              <a:t>29-11-21</a:t>
+              <a:t>01-12-21</a:t>
             </a:fld>
             <a:endParaRPr lang="fr-BE"/>
           </a:p>
@@ -1831,7 +1831,7 @@
           <a:p>
             <a:fld id="{7A3C3441-2C70-4949-8FF7-1C72443CF9D3}" type="datetimeFigureOut">
               <a:rPr lang="fr-BE" smtClean="0"/>
-              <a:t>29-11-21</a:t>
+              <a:t>01-12-21</a:t>
             </a:fld>
             <a:endParaRPr lang="fr-BE"/>
           </a:p>
@@ -1973,7 +1973,7 @@
           <a:p>
             <a:fld id="{7A3C3441-2C70-4949-8FF7-1C72443CF9D3}" type="datetimeFigureOut">
               <a:rPr lang="fr-BE" smtClean="0"/>
-              <a:t>29-11-21</a:t>
+              <a:t>01-12-21</a:t>
             </a:fld>
             <a:endParaRPr lang="fr-BE"/>
           </a:p>
@@ -2086,7 +2086,7 @@
           <a:p>
             <a:fld id="{7A3C3441-2C70-4949-8FF7-1C72443CF9D3}" type="datetimeFigureOut">
               <a:rPr lang="fr-BE" smtClean="0"/>
-              <a:t>29-11-21</a:t>
+              <a:t>01-12-21</a:t>
             </a:fld>
             <a:endParaRPr lang="fr-BE"/>
           </a:p>
@@ -2399,7 +2399,7 @@
           <a:p>
             <a:fld id="{7A3C3441-2C70-4949-8FF7-1C72443CF9D3}" type="datetimeFigureOut">
               <a:rPr lang="fr-BE" smtClean="0"/>
-              <a:t>29-11-21</a:t>
+              <a:t>01-12-21</a:t>
             </a:fld>
             <a:endParaRPr lang="fr-BE"/>
           </a:p>
@@ -2688,7 +2688,7 @@
           <a:p>
             <a:fld id="{7A3C3441-2C70-4949-8FF7-1C72443CF9D3}" type="datetimeFigureOut">
               <a:rPr lang="fr-BE" smtClean="0"/>
-              <a:t>29-11-21</a:t>
+              <a:t>01-12-21</a:t>
             </a:fld>
             <a:endParaRPr lang="fr-BE"/>
           </a:p>
@@ -2931,7 +2931,7 @@
           <a:p>
             <a:fld id="{7A3C3441-2C70-4949-8FF7-1C72443CF9D3}" type="datetimeFigureOut">
               <a:rPr lang="fr-BE" smtClean="0"/>
-              <a:t>29-11-21</a:t>
+              <a:t>01-12-21</a:t>
             </a:fld>
             <a:endParaRPr lang="fr-BE"/>
           </a:p>
@@ -4266,6 +4266,47 @@
           </p:txBody>
         </p:sp>
       </p:grpSp>
+      <p:cxnSp>
+        <p:nvCxnSpPr>
+          <p:cNvPr id="4" name="Connecteur droit avec flèche 3">
+            <a:extLst>
+              <a:ext uri="{FF2B5EF4-FFF2-40B4-BE49-F238E27FC236}">
+                <a16:creationId xmlns:a16="http://schemas.microsoft.com/office/drawing/2014/main" id="{68B4A757-24B8-421A-88BF-1FEA51601305}"/>
+              </a:ext>
+            </a:extLst>
+          </p:cNvPr>
+          <p:cNvCxnSpPr>
+            <a:stCxn id="14" idx="2"/>
+          </p:cNvCxnSpPr>
+          <p:nvPr/>
+        </p:nvCxnSpPr>
+        <p:spPr>
+          <a:xfrm>
+            <a:off x="3555499" y="2641016"/>
+            <a:ext cx="0" cy="258807"/>
+          </a:xfrm>
+          <a:prstGeom prst="straightConnector1">
+            <a:avLst/>
+          </a:prstGeom>
+          <a:ln>
+            <a:tailEnd type="triangle"/>
+          </a:ln>
+        </p:spPr>
+        <p:style>
+          <a:lnRef idx="1">
+            <a:schemeClr val="accent1"/>
+          </a:lnRef>
+          <a:fillRef idx="0">
+            <a:schemeClr val="accent1"/>
+          </a:fillRef>
+          <a:effectRef idx="0">
+            <a:schemeClr val="accent1"/>
+          </a:effectRef>
+          <a:fontRef idx="minor">
+            <a:schemeClr val="tx1"/>
+          </a:fontRef>
+        </p:style>
+      </p:cxnSp>
     </p:spTree>
     <p:extLst>
       <p:ext uri="{BB962C8B-B14F-4D97-AF65-F5344CB8AC3E}">

</xml_diff>

<commit_message>
Try to adapt DE0 with results of LOUIS
</commit_message>
<xml_diff>
--- a/schemeofcode.pptx
+++ b/schemeofcode.pptx
@@ -262,7 +262,7 @@
           <a:p>
             <a:fld id="{7A3C3441-2C70-4949-8FF7-1C72443CF9D3}" type="datetimeFigureOut">
               <a:rPr lang="fr-BE" smtClean="0"/>
-              <a:t>06-12-21</a:t>
+              <a:t>07-12-21</a:t>
             </a:fld>
             <a:endParaRPr lang="fr-BE"/>
           </a:p>
@@ -462,7 +462,7 @@
           <a:p>
             <a:fld id="{7A3C3441-2C70-4949-8FF7-1C72443CF9D3}" type="datetimeFigureOut">
               <a:rPr lang="fr-BE" smtClean="0"/>
-              <a:t>06-12-21</a:t>
+              <a:t>07-12-21</a:t>
             </a:fld>
             <a:endParaRPr lang="fr-BE"/>
           </a:p>
@@ -672,7 +672,7 @@
           <a:p>
             <a:fld id="{7A3C3441-2C70-4949-8FF7-1C72443CF9D3}" type="datetimeFigureOut">
               <a:rPr lang="fr-BE" smtClean="0"/>
-              <a:t>06-12-21</a:t>
+              <a:t>07-12-21</a:t>
             </a:fld>
             <a:endParaRPr lang="fr-BE"/>
           </a:p>
@@ -872,7 +872,7 @@
           <a:p>
             <a:fld id="{7A3C3441-2C70-4949-8FF7-1C72443CF9D3}" type="datetimeFigureOut">
               <a:rPr lang="fr-BE" smtClean="0"/>
-              <a:t>06-12-21</a:t>
+              <a:t>07-12-21</a:t>
             </a:fld>
             <a:endParaRPr lang="fr-BE"/>
           </a:p>
@@ -1148,7 +1148,7 @@
           <a:p>
             <a:fld id="{7A3C3441-2C70-4949-8FF7-1C72443CF9D3}" type="datetimeFigureOut">
               <a:rPr lang="fr-BE" smtClean="0"/>
-              <a:t>06-12-21</a:t>
+              <a:t>07-12-21</a:t>
             </a:fld>
             <a:endParaRPr lang="fr-BE"/>
           </a:p>
@@ -1416,7 +1416,7 @@
           <a:p>
             <a:fld id="{7A3C3441-2C70-4949-8FF7-1C72443CF9D3}" type="datetimeFigureOut">
               <a:rPr lang="fr-BE" smtClean="0"/>
-              <a:t>06-12-21</a:t>
+              <a:t>07-12-21</a:t>
             </a:fld>
             <a:endParaRPr lang="fr-BE"/>
           </a:p>
@@ -1831,7 +1831,7 @@
           <a:p>
             <a:fld id="{7A3C3441-2C70-4949-8FF7-1C72443CF9D3}" type="datetimeFigureOut">
               <a:rPr lang="fr-BE" smtClean="0"/>
-              <a:t>06-12-21</a:t>
+              <a:t>07-12-21</a:t>
             </a:fld>
             <a:endParaRPr lang="fr-BE"/>
           </a:p>
@@ -1973,7 +1973,7 @@
           <a:p>
             <a:fld id="{7A3C3441-2C70-4949-8FF7-1C72443CF9D3}" type="datetimeFigureOut">
               <a:rPr lang="fr-BE" smtClean="0"/>
-              <a:t>06-12-21</a:t>
+              <a:t>07-12-21</a:t>
             </a:fld>
             <a:endParaRPr lang="fr-BE"/>
           </a:p>
@@ -2086,7 +2086,7 @@
           <a:p>
             <a:fld id="{7A3C3441-2C70-4949-8FF7-1C72443CF9D3}" type="datetimeFigureOut">
               <a:rPr lang="fr-BE" smtClean="0"/>
-              <a:t>06-12-21</a:t>
+              <a:t>07-12-21</a:t>
             </a:fld>
             <a:endParaRPr lang="fr-BE"/>
           </a:p>
@@ -2399,7 +2399,7 @@
           <a:p>
             <a:fld id="{7A3C3441-2C70-4949-8FF7-1C72443CF9D3}" type="datetimeFigureOut">
               <a:rPr lang="fr-BE" smtClean="0"/>
-              <a:t>06-12-21</a:t>
+              <a:t>07-12-21</a:t>
             </a:fld>
             <a:endParaRPr lang="fr-BE"/>
           </a:p>
@@ -2688,7 +2688,7 @@
           <a:p>
             <a:fld id="{7A3C3441-2C70-4949-8FF7-1C72443CF9D3}" type="datetimeFigureOut">
               <a:rPr lang="fr-BE" smtClean="0"/>
-              <a:t>06-12-21</a:t>
+              <a:t>07-12-21</a:t>
             </a:fld>
             <a:endParaRPr lang="fr-BE"/>
           </a:p>
@@ -2931,7 +2931,7 @@
           <a:p>
             <a:fld id="{7A3C3441-2C70-4949-8FF7-1C72443CF9D3}" type="datetimeFigureOut">
               <a:rPr lang="fr-BE" smtClean="0"/>
-              <a:t>06-12-21</a:t>
+              <a:t>07-12-21</a:t>
             </a:fld>
             <a:endParaRPr lang="fr-BE"/>
           </a:p>
@@ -3362,7 +3362,7 @@
         </p:nvSpPr>
         <p:spPr>
           <a:xfrm>
-            <a:off x="2459541" y="2447993"/>
+            <a:off x="2558198" y="3171879"/>
             <a:ext cx="496800" cy="256905"/>
           </a:xfrm>
           <a:prstGeom prst="rect">
@@ -3411,7 +3411,7 @@
         </p:nvSpPr>
         <p:spPr>
           <a:xfrm>
-            <a:off x="3391412" y="2452415"/>
+            <a:off x="3361440" y="3176301"/>
             <a:ext cx="393392" cy="256905"/>
           </a:xfrm>
           <a:prstGeom prst="rect">
@@ -3460,7 +3460,7 @@
         </p:nvSpPr>
         <p:spPr>
           <a:xfrm>
-            <a:off x="3850118" y="2452415"/>
+            <a:off x="3820146" y="3176301"/>
             <a:ext cx="480688" cy="256905"/>
           </a:xfrm>
           <a:prstGeom prst="rect">
@@ -3509,7 +3509,7 @@
         </p:nvSpPr>
         <p:spPr>
           <a:xfrm>
-            <a:off x="1341067" y="2444953"/>
+            <a:off x="1454068" y="3168839"/>
             <a:ext cx="496800" cy="256905"/>
           </a:xfrm>
           <a:prstGeom prst="rect">
@@ -3558,8 +3558,8 @@
         </p:nvCxnSpPr>
         <p:spPr>
           <a:xfrm flipH="1">
-            <a:off x="2708796" y="1674391"/>
-            <a:ext cx="674599" cy="235553"/>
+            <a:off x="2807453" y="1806726"/>
+            <a:ext cx="1747311" cy="614453"/>
           </a:xfrm>
           <a:prstGeom prst="straightConnector1">
             <a:avLst/>
@@ -3601,8 +3601,8 @@
         </p:nvCxnSpPr>
         <p:spPr>
           <a:xfrm flipH="1">
-            <a:off x="1592618" y="1674391"/>
-            <a:ext cx="1790777" cy="235726"/>
+            <a:off x="1705619" y="1806726"/>
+            <a:ext cx="2849145" cy="614626"/>
           </a:xfrm>
           <a:prstGeom prst="straightConnector1">
             <a:avLst/>
@@ -3643,9 +3643,9 @@
           <p:nvPr/>
         </p:nvCxnSpPr>
         <p:spPr>
-          <a:xfrm>
-            <a:off x="3383395" y="1674391"/>
-            <a:ext cx="441579" cy="239069"/>
+          <a:xfrm flipH="1">
+            <a:off x="3795002" y="1806726"/>
+            <a:ext cx="759762" cy="617969"/>
           </a:xfrm>
           <a:prstGeom prst="straightConnector1">
             <a:avLst/>
@@ -3687,8 +3687,8 @@
         </p:nvCxnSpPr>
         <p:spPr>
           <a:xfrm>
-            <a:off x="3824974" y="2189890"/>
-            <a:ext cx="265488" cy="262525"/>
+            <a:off x="3795002" y="2701125"/>
+            <a:ext cx="265488" cy="475176"/>
           </a:xfrm>
           <a:prstGeom prst="straightConnector1">
             <a:avLst/>
@@ -3730,8 +3730,8 @@
         </p:nvCxnSpPr>
         <p:spPr>
           <a:xfrm flipH="1">
-            <a:off x="2707941" y="2186374"/>
-            <a:ext cx="855" cy="261619"/>
+            <a:off x="2806598" y="2697609"/>
+            <a:ext cx="855" cy="474270"/>
           </a:xfrm>
           <a:prstGeom prst="straightConnector1">
             <a:avLst/>
@@ -3773,8 +3773,8 @@
         </p:nvCxnSpPr>
         <p:spPr>
           <a:xfrm flipH="1">
-            <a:off x="3588108" y="2189890"/>
-            <a:ext cx="236866" cy="262525"/>
+            <a:off x="3558136" y="2701125"/>
+            <a:ext cx="236866" cy="475176"/>
           </a:xfrm>
           <a:prstGeom prst="straightConnector1">
             <a:avLst/>
@@ -3816,8 +3816,8 @@
         </p:nvCxnSpPr>
         <p:spPr>
           <a:xfrm flipH="1">
-            <a:off x="1589467" y="2186547"/>
-            <a:ext cx="3151" cy="258406"/>
+            <a:off x="1702468" y="2697782"/>
+            <a:ext cx="3151" cy="471057"/>
           </a:xfrm>
           <a:prstGeom prst="straightConnector1">
             <a:avLst/>
@@ -3877,12 +3877,12 @@
               <a:t>Class : </a:t>
             </a:r>
             <a:r>
-              <a:rPr lang="fr-FR" sz="1400" i="1" dirty="0" err="1">
+              <a:rPr lang="fr-FR" sz="1400" i="1" dirty="0">
                 <a:solidFill>
                   <a:schemeClr val="accent6"/>
                 </a:solidFill>
               </a:rPr>
-              <a:t>MyRobot</a:t>
+              <a:t>Robot</a:t>
             </a:r>
             <a:endParaRPr lang="fr-BE" sz="1400" i="1" dirty="0">
               <a:solidFill>
@@ -3906,8 +3906,8 @@
         </p:nvSpPr>
         <p:spPr>
           <a:xfrm>
-            <a:off x="896317" y="1049348"/>
-            <a:ext cx="5353092" cy="2511362"/>
+            <a:off x="896316" y="1049348"/>
+            <a:ext cx="8151431" cy="3370252"/>
           </a:xfrm>
           <a:prstGeom prst="roundRect">
             <a:avLst/>
@@ -3957,7 +3957,181 @@
         </p:nvSpPr>
         <p:spPr>
           <a:xfrm>
-            <a:off x="2977424" y="1397961"/>
+            <a:off x="4210261" y="1125134"/>
+            <a:ext cx="689006" cy="681592"/>
+          </a:xfrm>
+          <a:prstGeom prst="rect">
+            <a:avLst/>
+          </a:prstGeom>
+          <a:noFill/>
+          <a:ln w="6350">
+            <a:solidFill>
+              <a:schemeClr val="tx1"/>
+            </a:solidFill>
+          </a:ln>
+        </p:spPr>
+        <p:style>
+          <a:lnRef idx="2">
+            <a:schemeClr val="accent1">
+              <a:shade val="50000"/>
+            </a:schemeClr>
+          </a:lnRef>
+          <a:fillRef idx="1">
+            <a:schemeClr val="accent1"/>
+          </a:fillRef>
+          <a:effectRef idx="0">
+            <a:schemeClr val="accent1"/>
+          </a:effectRef>
+          <a:fontRef idx="minor">
+            <a:schemeClr val="lt1"/>
+          </a:fontRef>
+        </p:style>
+        <p:txBody>
+          <a:bodyPr rtlCol="0" anchor="ctr"/>
+          <a:lstStyle/>
+          <a:p>
+            <a:pPr algn="ctr"/>
+            <a:r>
+              <a:rPr lang="fr-FR" sz="1000" b="1" i="1" dirty="0">
+                <a:solidFill>
+                  <a:schemeClr val="accent6"/>
+                </a:solidFill>
+              </a:rPr>
+              <a:t>Robot</a:t>
+            </a:r>
+            <a:endParaRPr lang="fr-FR" sz="700" dirty="0">
+              <a:solidFill>
+                <a:srgbClr val="FF0000"/>
+              </a:solidFill>
+            </a:endParaRPr>
+          </a:p>
+          <a:p>
+            <a:pPr marL="171450" indent="-171450">
+              <a:buFont typeface="Arial" panose="020B0604020202020204" pitchFamily="34" charset="0"/>
+              <a:buChar char="•"/>
+            </a:pPr>
+            <a:r>
+              <a:rPr lang="fr-BE" sz="500" dirty="0" err="1">
+                <a:solidFill>
+                  <a:srgbClr val="0070C0"/>
+                </a:solidFill>
+              </a:rPr>
+              <a:t>Set_speeds</a:t>
+            </a:r>
+            <a:r>
+              <a:rPr lang="fr-BE" sz="500" dirty="0">
+                <a:solidFill>
+                  <a:srgbClr val="0070C0"/>
+                </a:solidFill>
+              </a:rPr>
+              <a:t>()</a:t>
+            </a:r>
+          </a:p>
+          <a:p>
+            <a:pPr marL="171450" indent="-171450">
+              <a:buFont typeface="Arial" panose="020B0604020202020204" pitchFamily="34" charset="0"/>
+              <a:buChar char="•"/>
+            </a:pPr>
+            <a:r>
+              <a:rPr lang="fr-BE" sz="500" dirty="0" err="1">
+                <a:solidFill>
+                  <a:srgbClr val="0070C0"/>
+                </a:solidFill>
+              </a:rPr>
+              <a:t>Print_infos</a:t>
+            </a:r>
+            <a:r>
+              <a:rPr lang="fr-BE" sz="500" dirty="0">
+                <a:solidFill>
+                  <a:srgbClr val="0070C0"/>
+                </a:solidFill>
+              </a:rPr>
+              <a:t>()</a:t>
+            </a:r>
+          </a:p>
+          <a:p>
+            <a:pPr marL="171450" indent="-171450">
+              <a:buFont typeface="Arial" panose="020B0604020202020204" pitchFamily="34" charset="0"/>
+              <a:buChar char="•"/>
+            </a:pPr>
+            <a:r>
+              <a:rPr lang="fr-BE" sz="500" dirty="0" err="1">
+                <a:solidFill>
+                  <a:srgbClr val="0070C0"/>
+                </a:solidFill>
+              </a:rPr>
+              <a:t>isON</a:t>
+            </a:r>
+            <a:r>
+              <a:rPr lang="fr-BE" sz="500" dirty="0">
+                <a:solidFill>
+                  <a:srgbClr val="0070C0"/>
+                </a:solidFill>
+              </a:rPr>
+              <a:t>()</a:t>
+            </a:r>
+          </a:p>
+          <a:p>
+            <a:pPr marL="171450" indent="-171450">
+              <a:buFont typeface="Arial" panose="020B0604020202020204" pitchFamily="34" charset="0"/>
+              <a:buChar char="•"/>
+            </a:pPr>
+            <a:r>
+              <a:rPr lang="fr-BE" sz="500" dirty="0" err="1">
+                <a:solidFill>
+                  <a:srgbClr val="0070C0"/>
+                </a:solidFill>
+              </a:rPr>
+              <a:t>Activate</a:t>
+            </a:r>
+            <a:r>
+              <a:rPr lang="fr-BE" sz="500" dirty="0">
+                <a:solidFill>
+                  <a:srgbClr val="0070C0"/>
+                </a:solidFill>
+              </a:rPr>
+              <a:t>()</a:t>
+            </a:r>
+          </a:p>
+          <a:p>
+            <a:pPr marL="171450" indent="-171450">
+              <a:buFont typeface="Arial" panose="020B0604020202020204" pitchFamily="34" charset="0"/>
+              <a:buChar char="•"/>
+            </a:pPr>
+            <a:r>
+              <a:rPr lang="fr-BE" sz="500" dirty="0" err="1">
+                <a:solidFill>
+                  <a:srgbClr val="0070C0"/>
+                </a:solidFill>
+              </a:rPr>
+              <a:t>Shutdown</a:t>
+            </a:r>
+            <a:r>
+              <a:rPr lang="fr-BE" sz="500" dirty="0">
+                <a:solidFill>
+                  <a:srgbClr val="0070C0"/>
+                </a:solidFill>
+              </a:rPr>
+              <a:t>()</a:t>
+            </a:r>
+          </a:p>
+        </p:txBody>
+      </p:sp>
+      <p:sp>
+        <p:nvSpPr>
+          <p:cNvPr id="48" name="Rectangle 47">
+            <a:extLst>
+              <a:ext uri="{FF2B5EF4-FFF2-40B4-BE49-F238E27FC236}">
+                <a16:creationId xmlns:a16="http://schemas.microsoft.com/office/drawing/2014/main" id="{3EE2C901-9053-49AC-8B34-DB2BC27DC605}"/>
+              </a:ext>
+            </a:extLst>
+          </p:cNvPr>
+          <p:cNvSpPr/>
+          <p:nvPr/>
+        </p:nvSpPr>
+        <p:spPr>
+          <a:xfrm>
+            <a:off x="2401482" y="2421179"/>
             <a:ext cx="811941" cy="276430"/>
           </a:xfrm>
           <a:prstGeom prst="rect">
@@ -3992,16 +4166,16 @@
           <a:p>
             <a:pPr algn="ctr"/>
             <a:r>
-              <a:rPr lang="fr-FR" sz="1000" b="1" dirty="0" err="1">
-                <a:solidFill>
-                  <a:schemeClr val="accent6"/>
+              <a:rPr lang="fr-FR" sz="800" dirty="0" err="1">
+                <a:solidFill>
+                  <a:schemeClr val="tx1"/>
                 </a:solidFill>
               </a:rPr>
-              <a:t>MyRobot</a:t>
-            </a:r>
-            <a:endParaRPr lang="fr-BE" sz="800" b="1" dirty="0">
+              <a:t>actuators</a:t>
+            </a:r>
+            <a:endParaRPr lang="fr-BE" sz="800" dirty="0">
               <a:solidFill>
-                <a:schemeClr val="accent6"/>
+                <a:schemeClr val="tx1"/>
               </a:solidFill>
             </a:endParaRPr>
           </a:p>
@@ -4009,10 +4183,10 @@
       </p:sp>
       <p:sp>
         <p:nvSpPr>
-          <p:cNvPr id="48" name="Rectangle 47">
-            <a:extLst>
-              <a:ext uri="{FF2B5EF4-FFF2-40B4-BE49-F238E27FC236}">
-                <a16:creationId xmlns:a16="http://schemas.microsoft.com/office/drawing/2014/main" id="{3EE2C901-9053-49AC-8B34-DB2BC27DC605}"/>
+          <p:cNvPr id="49" name="Rectangle 48">
+            <a:extLst>
+              <a:ext uri="{FF2B5EF4-FFF2-40B4-BE49-F238E27FC236}">
+                <a16:creationId xmlns:a16="http://schemas.microsoft.com/office/drawing/2014/main" id="{31D9AF1C-F3B1-47A5-A0F1-D18EBE02FB5E}"/>
               </a:ext>
             </a:extLst>
           </p:cNvPr>
@@ -4021,7 +4195,7 @@
         </p:nvSpPr>
         <p:spPr>
           <a:xfrm>
-            <a:off x="2302825" y="1909944"/>
+            <a:off x="3389031" y="2424695"/>
             <a:ext cx="811941" cy="276430"/>
           </a:xfrm>
           <a:prstGeom prst="rect">
@@ -4056,16 +4230,16 @@
           <a:p>
             <a:pPr algn="ctr"/>
             <a:r>
-              <a:rPr lang="fr-FR" sz="800" dirty="0" err="1">
-                <a:solidFill>
-                  <a:schemeClr val="tx1"/>
+              <a:rPr lang="fr-FR" sz="800" b="1" i="1" dirty="0" err="1">
+                <a:solidFill>
+                  <a:schemeClr val="accent6"/>
                 </a:solidFill>
               </a:rPr>
-              <a:t>Actuators</a:t>
-            </a:r>
-            <a:endParaRPr lang="fr-BE" sz="800" dirty="0">
+              <a:t>Sensors</a:t>
+            </a:r>
+            <a:endParaRPr lang="fr-BE" sz="800" b="1" i="1" dirty="0">
               <a:solidFill>
-                <a:schemeClr val="tx1"/>
+                <a:schemeClr val="accent6"/>
               </a:solidFill>
             </a:endParaRPr>
           </a:p>
@@ -4073,10 +4247,10 @@
       </p:sp>
       <p:sp>
         <p:nvSpPr>
-          <p:cNvPr id="49" name="Rectangle 48">
-            <a:extLst>
-              <a:ext uri="{FF2B5EF4-FFF2-40B4-BE49-F238E27FC236}">
-                <a16:creationId xmlns:a16="http://schemas.microsoft.com/office/drawing/2014/main" id="{31D9AF1C-F3B1-47A5-A0F1-D18EBE02FB5E}"/>
+          <p:cNvPr id="50" name="Rectangle 49">
+            <a:extLst>
+              <a:ext uri="{FF2B5EF4-FFF2-40B4-BE49-F238E27FC236}">
+                <a16:creationId xmlns:a16="http://schemas.microsoft.com/office/drawing/2014/main" id="{4C9B7C03-18BB-4DE9-A8E5-999E75F00EF2}"/>
               </a:ext>
             </a:extLst>
           </p:cNvPr>
@@ -4085,7 +4259,7 @@
         </p:nvSpPr>
         <p:spPr>
           <a:xfrm>
-            <a:off x="3419003" y="1913460"/>
+            <a:off x="1299648" y="2421352"/>
             <a:ext cx="811941" cy="276430"/>
           </a:xfrm>
           <a:prstGeom prst="rect">
@@ -4120,12 +4294,12 @@
           <a:p>
             <a:pPr algn="ctr"/>
             <a:r>
-              <a:rPr lang="fr-FR" sz="800" dirty="0" err="1">
+              <a:rPr lang="fr-FR" sz="800" dirty="0">
                 <a:solidFill>
                   <a:schemeClr val="tx1"/>
                 </a:solidFill>
               </a:rPr>
-              <a:t>Sensors</a:t>
+              <a:t>infos</a:t>
             </a:r>
             <a:endParaRPr lang="fr-BE" sz="800" dirty="0">
               <a:solidFill>
@@ -4135,12 +4309,98 @@
           </a:p>
         </p:txBody>
       </p:sp>
-      <p:sp>
-        <p:nvSpPr>
-          <p:cNvPr id="50" name="Rectangle 49">
-            <a:extLst>
-              <a:ext uri="{FF2B5EF4-FFF2-40B4-BE49-F238E27FC236}">
-                <a16:creationId xmlns:a16="http://schemas.microsoft.com/office/drawing/2014/main" id="{4C9B7C03-18BB-4DE9-A8E5-999E75F00EF2}"/>
+      <p:cxnSp>
+        <p:nvCxnSpPr>
+          <p:cNvPr id="23" name="Connecteur droit avec flèche 22">
+            <a:extLst>
+              <a:ext uri="{FF2B5EF4-FFF2-40B4-BE49-F238E27FC236}">
+                <a16:creationId xmlns:a16="http://schemas.microsoft.com/office/drawing/2014/main" id="{A4ABB349-66E0-481A-8713-8B31F703E938}"/>
+              </a:ext>
+            </a:extLst>
+          </p:cNvPr>
+          <p:cNvCxnSpPr>
+            <a:cxnSpLocks/>
+            <a:stCxn id="14" idx="2"/>
+            <a:endCxn id="32" idx="0"/>
+          </p:cNvCxnSpPr>
+          <p:nvPr/>
+        </p:nvCxnSpPr>
+        <p:spPr>
+          <a:xfrm>
+            <a:off x="4060490" y="3433206"/>
+            <a:ext cx="253930" cy="395719"/>
+          </a:xfrm>
+          <a:prstGeom prst="straightConnector1">
+            <a:avLst/>
+          </a:prstGeom>
+          <a:ln w="6350">
+            <a:tailEnd type="triangle"/>
+          </a:ln>
+        </p:spPr>
+        <p:style>
+          <a:lnRef idx="2">
+            <a:schemeClr val="dk1"/>
+          </a:lnRef>
+          <a:fillRef idx="1">
+            <a:schemeClr val="lt1"/>
+          </a:fillRef>
+          <a:effectRef idx="0">
+            <a:schemeClr val="dk1"/>
+          </a:effectRef>
+          <a:fontRef idx="minor">
+            <a:schemeClr val="dk1"/>
+          </a:fontRef>
+        </p:style>
+      </p:cxnSp>
+      <p:cxnSp>
+        <p:nvCxnSpPr>
+          <p:cNvPr id="25" name="Connecteur droit avec flèche 24">
+            <a:extLst>
+              <a:ext uri="{FF2B5EF4-FFF2-40B4-BE49-F238E27FC236}">
+                <a16:creationId xmlns:a16="http://schemas.microsoft.com/office/drawing/2014/main" id="{3CD34A56-7DF2-4289-AB69-C9B2283A878D}"/>
+              </a:ext>
+            </a:extLst>
+          </p:cNvPr>
+          <p:cNvCxnSpPr>
+            <a:cxnSpLocks/>
+            <a:stCxn id="14" idx="2"/>
+            <a:endCxn id="28" idx="0"/>
+          </p:cNvCxnSpPr>
+          <p:nvPr/>
+        </p:nvCxnSpPr>
+        <p:spPr>
+          <a:xfrm flipH="1">
+            <a:off x="3799737" y="3433206"/>
+            <a:ext cx="260753" cy="395720"/>
+          </a:xfrm>
+          <a:prstGeom prst="straightConnector1">
+            <a:avLst/>
+          </a:prstGeom>
+          <a:ln w="6350">
+            <a:tailEnd type="triangle"/>
+          </a:ln>
+        </p:spPr>
+        <p:style>
+          <a:lnRef idx="2">
+            <a:schemeClr val="dk1"/>
+          </a:lnRef>
+          <a:fillRef idx="1">
+            <a:schemeClr val="lt1"/>
+          </a:fillRef>
+          <a:effectRef idx="0">
+            <a:schemeClr val="dk1"/>
+          </a:effectRef>
+          <a:fontRef idx="minor">
+            <a:schemeClr val="dk1"/>
+          </a:fontRef>
+        </p:style>
+      </p:cxnSp>
+      <p:sp>
+        <p:nvSpPr>
+          <p:cNvPr id="28" name="Rectangle 27">
+            <a:extLst>
+              <a:ext uri="{FF2B5EF4-FFF2-40B4-BE49-F238E27FC236}">
+                <a16:creationId xmlns:a16="http://schemas.microsoft.com/office/drawing/2014/main" id="{658A720D-2DEB-40AA-901B-9E2D4CDAE949}"/>
               </a:ext>
             </a:extLst>
           </p:cNvPr>
@@ -4149,8 +4409,106 @@
         </p:nvSpPr>
         <p:spPr>
           <a:xfrm>
-            <a:off x="1186647" y="1910117"/>
-            <a:ext cx="811941" cy="276430"/>
+            <a:off x="3559393" y="3828926"/>
+            <a:ext cx="480688" cy="256905"/>
+          </a:xfrm>
+          <a:prstGeom prst="rect">
+            <a:avLst/>
+          </a:prstGeom>
+          <a:ln w="6350"/>
+        </p:spPr>
+        <p:style>
+          <a:lnRef idx="2">
+            <a:schemeClr val="dk1"/>
+          </a:lnRef>
+          <a:fillRef idx="1">
+            <a:schemeClr val="lt1"/>
+          </a:fillRef>
+          <a:effectRef idx="0">
+            <a:schemeClr val="dk1"/>
+          </a:effectRef>
+          <a:fontRef idx="minor">
+            <a:schemeClr val="dk1"/>
+          </a:fontRef>
+        </p:style>
+        <p:txBody>
+          <a:bodyPr rtlCol="0" anchor="ctr"/>
+          <a:lstStyle/>
+          <a:p>
+            <a:pPr algn="ctr"/>
+            <a:r>
+              <a:rPr lang="fr-FR" sz="700" dirty="0"/>
+              <a:t>Button</a:t>
+            </a:r>
+            <a:endParaRPr lang="fr-BE" sz="700" dirty="0"/>
+          </a:p>
+        </p:txBody>
+      </p:sp>
+      <p:sp>
+        <p:nvSpPr>
+          <p:cNvPr id="32" name="Rectangle 31">
+            <a:extLst>
+              <a:ext uri="{FF2B5EF4-FFF2-40B4-BE49-F238E27FC236}">
+                <a16:creationId xmlns:a16="http://schemas.microsoft.com/office/drawing/2014/main" id="{EB5A9545-B7E4-4D67-89BE-38C276A2D324}"/>
+              </a:ext>
+            </a:extLst>
+          </p:cNvPr>
+          <p:cNvSpPr/>
+          <p:nvPr/>
+        </p:nvSpPr>
+        <p:spPr>
+          <a:xfrm>
+            <a:off x="4074076" y="3828925"/>
+            <a:ext cx="480688" cy="256905"/>
+          </a:xfrm>
+          <a:prstGeom prst="rect">
+            <a:avLst/>
+          </a:prstGeom>
+          <a:ln w="6350"/>
+        </p:spPr>
+        <p:style>
+          <a:lnRef idx="2">
+            <a:schemeClr val="dk1"/>
+          </a:lnRef>
+          <a:fillRef idx="1">
+            <a:schemeClr val="lt1"/>
+          </a:fillRef>
+          <a:effectRef idx="0">
+            <a:schemeClr val="dk1"/>
+          </a:effectRef>
+          <a:fontRef idx="minor">
+            <a:schemeClr val="dk1"/>
+          </a:fontRef>
+        </p:style>
+        <p:txBody>
+          <a:bodyPr rtlCol="0" anchor="ctr"/>
+          <a:lstStyle/>
+          <a:p>
+            <a:pPr algn="ctr"/>
+            <a:r>
+              <a:rPr lang="fr-FR" sz="700" dirty="0"/>
+              <a:t>Button</a:t>
+            </a:r>
+            <a:endParaRPr lang="fr-BE" sz="700" dirty="0"/>
+          </a:p>
+        </p:txBody>
+      </p:sp>
+      <p:sp>
+        <p:nvSpPr>
+          <p:cNvPr id="27" name="Rectangle 26">
+            <a:extLst>
+              <a:ext uri="{FF2B5EF4-FFF2-40B4-BE49-F238E27FC236}">
+                <a16:creationId xmlns:a16="http://schemas.microsoft.com/office/drawing/2014/main" id="{69555244-E172-4C78-9E91-13A48D6EFF5C}"/>
+              </a:ext>
+            </a:extLst>
+          </p:cNvPr>
+          <p:cNvSpPr/>
+          <p:nvPr/>
+        </p:nvSpPr>
+        <p:spPr>
+          <a:xfrm>
+            <a:off x="5657109" y="2421179"/>
+            <a:ext cx="1211555" cy="395774"/>
           </a:xfrm>
           <a:prstGeom prst="rect">
             <a:avLst/>
@@ -4184,41 +4542,479 @@
           <a:p>
             <a:pPr algn="ctr"/>
             <a:r>
-              <a:rPr lang="fr-FR" sz="800" dirty="0">
-                <a:solidFill>
-                  <a:schemeClr val="tx1"/>
+              <a:rPr lang="fr-FR" sz="900" b="1" i="1" dirty="0">
+                <a:solidFill>
+                  <a:schemeClr val="accent6"/>
                 </a:solidFill>
               </a:rPr>
-              <a:t>Infos</a:t>
-            </a:r>
-            <a:endParaRPr lang="fr-BE" sz="800" dirty="0">
+              <a:t>Controller</a:t>
+            </a:r>
+            <a:endParaRPr lang="fr-FR" sz="400" dirty="0">
               <a:solidFill>
-                <a:schemeClr val="tx1"/>
+                <a:schemeClr val="accent6"/>
               </a:solidFill>
             </a:endParaRPr>
           </a:p>
+          <a:p>
+            <a:pPr marL="171450" indent="-171450">
+              <a:buFont typeface="Arial" panose="020B0604020202020204" pitchFamily="34" charset="0"/>
+              <a:buChar char="•"/>
+            </a:pPr>
+            <a:r>
+              <a:rPr lang="fr-FR" sz="500" dirty="0" err="1">
+                <a:solidFill>
+                  <a:srgbClr val="0070C0"/>
+                </a:solidFill>
+              </a:rPr>
+              <a:t>Send_to_motors</a:t>
+            </a:r>
+            <a:r>
+              <a:rPr lang="fr-FR" sz="500" dirty="0">
+                <a:solidFill>
+                  <a:srgbClr val="0070C0"/>
+                </a:solidFill>
+              </a:rPr>
+              <a:t>()</a:t>
+            </a:r>
+          </a:p>
+          <a:p>
+            <a:pPr marL="171450" indent="-171450">
+              <a:buFont typeface="Arial" panose="020B0604020202020204" pitchFamily="34" charset="0"/>
+              <a:buChar char="•"/>
+            </a:pPr>
+            <a:r>
+              <a:rPr lang="fr-FR" sz="500" dirty="0" err="1">
+                <a:solidFill>
+                  <a:srgbClr val="0070C0"/>
+                </a:solidFill>
+              </a:rPr>
+              <a:t>Set_cartesian_ref</a:t>
+            </a:r>
+            <a:r>
+              <a:rPr lang="fr-FR" sz="500" dirty="0">
+                <a:solidFill>
+                  <a:srgbClr val="0070C0"/>
+                </a:solidFill>
+              </a:rPr>
+              <a:t>(</a:t>
+            </a:r>
+            <a:r>
+              <a:rPr lang="fr-FR" sz="500" dirty="0" err="1">
+                <a:solidFill>
+                  <a:srgbClr val="0070C0"/>
+                </a:solidFill>
+              </a:rPr>
+              <a:t>new_x,new_y</a:t>
+            </a:r>
+            <a:r>
+              <a:rPr lang="fr-FR" sz="500" dirty="0">
+                <a:solidFill>
+                  <a:srgbClr val="0070C0"/>
+                </a:solidFill>
+              </a:rPr>
+              <a:t>)</a:t>
+            </a:r>
+            <a:endParaRPr lang="fr-BE" sz="400" dirty="0">
+              <a:solidFill>
+                <a:srgbClr val="0070C0"/>
+              </a:solidFill>
+            </a:endParaRPr>
+          </a:p>
         </p:txBody>
       </p:sp>
       <p:cxnSp>
         <p:nvCxnSpPr>
-          <p:cNvPr id="23" name="Connecteur droit avec flèche 22">
-            <a:extLst>
-              <a:ext uri="{FF2B5EF4-FFF2-40B4-BE49-F238E27FC236}">
-                <a16:creationId xmlns:a16="http://schemas.microsoft.com/office/drawing/2014/main" id="{A4ABB349-66E0-481A-8713-8B31F703E938}"/>
+          <p:cNvPr id="4" name="Connecteur droit avec flèche 3">
+            <a:extLst>
+              <a:ext uri="{FF2B5EF4-FFF2-40B4-BE49-F238E27FC236}">
+                <a16:creationId xmlns:a16="http://schemas.microsoft.com/office/drawing/2014/main" id="{6BD49D05-4F85-46F5-82CC-25F46C9080B8}"/>
               </a:ext>
             </a:extLst>
           </p:cNvPr>
           <p:cNvCxnSpPr>
             <a:cxnSpLocks/>
-            <a:stCxn id="14" idx="2"/>
-            <a:endCxn id="32" idx="0"/>
+            <a:stCxn id="40" idx="2"/>
+            <a:endCxn id="27" idx="0"/>
           </p:cNvCxnSpPr>
           <p:nvPr/>
         </p:nvCxnSpPr>
         <p:spPr>
           <a:xfrm>
-            <a:off x="4090462" y="2709320"/>
-            <a:ext cx="253930" cy="197244"/>
+            <a:off x="4554764" y="1806726"/>
+            <a:ext cx="1708123" cy="614453"/>
+          </a:xfrm>
+          <a:prstGeom prst="straightConnector1">
+            <a:avLst/>
+          </a:prstGeom>
+          <a:ln>
+            <a:tailEnd type="triangle"/>
+          </a:ln>
+        </p:spPr>
+        <p:style>
+          <a:lnRef idx="1">
+            <a:schemeClr val="dk1"/>
+          </a:lnRef>
+          <a:fillRef idx="0">
+            <a:schemeClr val="dk1"/>
+          </a:fillRef>
+          <a:effectRef idx="0">
+            <a:schemeClr val="dk1"/>
+          </a:effectRef>
+          <a:fontRef idx="minor">
+            <a:schemeClr val="tx1"/>
+          </a:fontRef>
+        </p:style>
+      </p:cxnSp>
+      <p:sp>
+        <p:nvSpPr>
+          <p:cNvPr id="29" name="Rectangle 28">
+            <a:extLst>
+              <a:ext uri="{FF2B5EF4-FFF2-40B4-BE49-F238E27FC236}">
+                <a16:creationId xmlns:a16="http://schemas.microsoft.com/office/drawing/2014/main" id="{DCEF24D3-0F6B-4223-A1B6-2DEB4DF0C4BC}"/>
+              </a:ext>
+            </a:extLst>
+          </p:cNvPr>
+          <p:cNvSpPr/>
+          <p:nvPr/>
+        </p:nvSpPr>
+        <p:spPr>
+          <a:xfrm>
+            <a:off x="5576653" y="3196514"/>
+            <a:ext cx="1380088" cy="591800"/>
+          </a:xfrm>
+          <a:prstGeom prst="rect">
+            <a:avLst/>
+          </a:prstGeom>
+          <a:ln w="6350"/>
+        </p:spPr>
+        <p:style>
+          <a:lnRef idx="2">
+            <a:schemeClr val="dk1"/>
+          </a:lnRef>
+          <a:fillRef idx="1">
+            <a:schemeClr val="lt1"/>
+          </a:fillRef>
+          <a:effectRef idx="0">
+            <a:schemeClr val="dk1"/>
+          </a:effectRef>
+          <a:fontRef idx="minor">
+            <a:schemeClr val="dk1"/>
+          </a:fontRef>
+        </p:style>
+        <p:txBody>
+          <a:bodyPr rtlCol="0" anchor="ctr"/>
+          <a:lstStyle/>
+          <a:p>
+            <a:pPr algn="ctr"/>
+            <a:r>
+              <a:rPr lang="fr-FR" sz="800" b="1" i="1" dirty="0" err="1">
+                <a:solidFill>
+                  <a:schemeClr val="accent6"/>
+                </a:solidFill>
+              </a:rPr>
+              <a:t>PID_obj</a:t>
+            </a:r>
+            <a:endParaRPr lang="fr-FR" sz="600" b="1" i="1" dirty="0">
+              <a:solidFill>
+                <a:schemeClr val="accent5"/>
+              </a:solidFill>
+            </a:endParaRPr>
+          </a:p>
+          <a:p>
+            <a:pPr marL="171450" indent="-171450">
+              <a:buFont typeface="Arial" panose="020B0604020202020204" pitchFamily="34" charset="0"/>
+              <a:buChar char="•"/>
+            </a:pPr>
+            <a:r>
+              <a:rPr lang="fr-FR" sz="500" dirty="0" err="1">
+                <a:solidFill>
+                  <a:schemeClr val="accent5"/>
+                </a:solidFill>
+              </a:rPr>
+              <a:t>Set_setpoint_l</a:t>
+            </a:r>
+            <a:r>
+              <a:rPr lang="fr-FR" sz="500" dirty="0">
+                <a:solidFill>
+                  <a:schemeClr val="accent5"/>
+                </a:solidFill>
+              </a:rPr>
+              <a:t>(</a:t>
+            </a:r>
+            <a:r>
+              <a:rPr lang="fr-FR" sz="500" dirty="0" err="1">
+                <a:solidFill>
+                  <a:schemeClr val="accent5"/>
+                </a:solidFill>
+              </a:rPr>
+              <a:t>sp</a:t>
+            </a:r>
+            <a:r>
+              <a:rPr lang="fr-FR" sz="500" dirty="0">
+                <a:solidFill>
+                  <a:schemeClr val="accent5"/>
+                </a:solidFill>
+              </a:rPr>
+              <a:t>)</a:t>
+            </a:r>
+          </a:p>
+          <a:p>
+            <a:pPr marL="171450" indent="-171450">
+              <a:buFont typeface="Arial" panose="020B0604020202020204" pitchFamily="34" charset="0"/>
+              <a:buChar char="•"/>
+            </a:pPr>
+            <a:r>
+              <a:rPr lang="fr-FR" sz="500" dirty="0" err="1">
+                <a:solidFill>
+                  <a:schemeClr val="accent5"/>
+                </a:solidFill>
+              </a:rPr>
+              <a:t>Set_setpoint_r</a:t>
+            </a:r>
+            <a:r>
+              <a:rPr lang="fr-FR" sz="500" dirty="0">
+                <a:solidFill>
+                  <a:schemeClr val="accent5"/>
+                </a:solidFill>
+              </a:rPr>
+              <a:t>(</a:t>
+            </a:r>
+            <a:r>
+              <a:rPr lang="fr-FR" sz="500" dirty="0" err="1">
+                <a:solidFill>
+                  <a:schemeClr val="accent5"/>
+                </a:solidFill>
+              </a:rPr>
+              <a:t>sp</a:t>
+            </a:r>
+            <a:r>
+              <a:rPr lang="fr-FR" sz="500" dirty="0">
+                <a:solidFill>
+                  <a:schemeClr val="accent5"/>
+                </a:solidFill>
+              </a:rPr>
+              <a:t>)</a:t>
+            </a:r>
+          </a:p>
+          <a:p>
+            <a:pPr marL="171450" indent="-171450">
+              <a:buFont typeface="Arial" panose="020B0604020202020204" pitchFamily="34" charset="0"/>
+              <a:buChar char="•"/>
+            </a:pPr>
+            <a:r>
+              <a:rPr lang="fr-FR" sz="500" dirty="0" err="1">
+                <a:solidFill>
+                  <a:schemeClr val="accent5"/>
+                </a:solidFill>
+              </a:rPr>
+              <a:t>Set_mes</a:t>
+            </a:r>
+            <a:r>
+              <a:rPr lang="fr-FR" sz="500" dirty="0">
+                <a:solidFill>
+                  <a:schemeClr val="accent5"/>
+                </a:solidFill>
+              </a:rPr>
+              <a:t>(</a:t>
+            </a:r>
+            <a:r>
+              <a:rPr lang="fr-FR" sz="500" dirty="0" err="1">
+                <a:solidFill>
+                  <a:schemeClr val="accent5"/>
+                </a:solidFill>
+              </a:rPr>
+              <a:t>omega_mes_l,omega_mes_r</a:t>
+            </a:r>
+            <a:r>
+              <a:rPr lang="fr-FR" sz="500" dirty="0">
+                <a:solidFill>
+                  <a:schemeClr val="accent5"/>
+                </a:solidFill>
+              </a:rPr>
+              <a:t>)</a:t>
+            </a:r>
+          </a:p>
+          <a:p>
+            <a:pPr marL="171450" indent="-171450">
+              <a:buFont typeface="Arial" panose="020B0604020202020204" pitchFamily="34" charset="0"/>
+              <a:buChar char="•"/>
+            </a:pPr>
+            <a:r>
+              <a:rPr lang="fr-FR" sz="500" dirty="0" err="1">
+                <a:solidFill>
+                  <a:schemeClr val="accent5"/>
+                </a:solidFill>
+              </a:rPr>
+              <a:t>Output_value_l</a:t>
+            </a:r>
+            <a:r>
+              <a:rPr lang="fr-FR" sz="500" dirty="0">
+                <a:solidFill>
+                  <a:schemeClr val="accent5"/>
+                </a:solidFill>
+              </a:rPr>
+              <a:t>()</a:t>
+            </a:r>
+          </a:p>
+          <a:p>
+            <a:pPr marL="171450" indent="-171450">
+              <a:buFont typeface="Arial" panose="020B0604020202020204" pitchFamily="34" charset="0"/>
+              <a:buChar char="•"/>
+            </a:pPr>
+            <a:r>
+              <a:rPr lang="fr-FR" sz="500" dirty="0" err="1">
+                <a:solidFill>
+                  <a:schemeClr val="accent5"/>
+                </a:solidFill>
+              </a:rPr>
+              <a:t>Output_value_r</a:t>
+            </a:r>
+            <a:r>
+              <a:rPr lang="fr-FR" sz="500" dirty="0">
+                <a:solidFill>
+                  <a:schemeClr val="accent5"/>
+                </a:solidFill>
+              </a:rPr>
+              <a:t>()</a:t>
+            </a:r>
+            <a:endParaRPr lang="fr-BE" sz="700" dirty="0">
+              <a:solidFill>
+                <a:schemeClr val="accent6"/>
+              </a:solidFill>
+            </a:endParaRPr>
+          </a:p>
+        </p:txBody>
+      </p:sp>
+      <p:sp>
+        <p:nvSpPr>
+          <p:cNvPr id="33" name="Rectangle 32">
+            <a:extLst>
+              <a:ext uri="{FF2B5EF4-FFF2-40B4-BE49-F238E27FC236}">
+                <a16:creationId xmlns:a16="http://schemas.microsoft.com/office/drawing/2014/main" id="{A8994D85-AACC-45E5-9C36-C9ED0B334878}"/>
+              </a:ext>
+            </a:extLst>
+          </p:cNvPr>
+          <p:cNvSpPr/>
+          <p:nvPr/>
+        </p:nvSpPr>
+        <p:spPr>
+          <a:xfrm>
+            <a:off x="7155155" y="3194919"/>
+            <a:ext cx="712305" cy="395774"/>
+          </a:xfrm>
+          <a:prstGeom prst="rect">
+            <a:avLst/>
+          </a:prstGeom>
+          <a:ln w="6350"/>
+        </p:spPr>
+        <p:style>
+          <a:lnRef idx="2">
+            <a:schemeClr val="dk1"/>
+          </a:lnRef>
+          <a:fillRef idx="1">
+            <a:schemeClr val="lt1"/>
+          </a:fillRef>
+          <a:effectRef idx="0">
+            <a:schemeClr val="dk1"/>
+          </a:effectRef>
+          <a:fontRef idx="minor">
+            <a:schemeClr val="dk1"/>
+          </a:fontRef>
+        </p:style>
+        <p:txBody>
+          <a:bodyPr rtlCol="0" anchor="ctr"/>
+          <a:lstStyle/>
+          <a:p>
+            <a:pPr algn="ctr"/>
+            <a:r>
+              <a:rPr lang="fr-FR" sz="800" b="1" i="1" dirty="0">
+                <a:solidFill>
+                  <a:schemeClr val="accent6"/>
+                </a:solidFill>
+              </a:rPr>
+              <a:t>DEO2RPI</a:t>
+            </a:r>
+          </a:p>
+          <a:p>
+            <a:pPr marL="171450" indent="-171450">
+              <a:buFont typeface="Arial" panose="020B0604020202020204" pitchFamily="34" charset="0"/>
+              <a:buChar char="•"/>
+            </a:pPr>
+            <a:r>
+              <a:rPr lang="fr-FR" sz="500" dirty="0">
+                <a:solidFill>
+                  <a:srgbClr val="0070C0"/>
+                </a:solidFill>
+              </a:rPr>
+              <a:t>count(spi)</a:t>
+            </a:r>
+          </a:p>
+          <a:p>
+            <a:pPr marL="171450" indent="-171450">
+              <a:buFont typeface="Arial" panose="020B0604020202020204" pitchFamily="34" charset="0"/>
+              <a:buChar char="•"/>
+            </a:pPr>
+            <a:r>
+              <a:rPr lang="fr-FR" sz="500" dirty="0" err="1">
+                <a:solidFill>
+                  <a:srgbClr val="0070C0"/>
+                </a:solidFill>
+              </a:rPr>
+              <a:t>dright</a:t>
+            </a:r>
+            <a:r>
+              <a:rPr lang="fr-FR" sz="500" dirty="0">
+                <a:solidFill>
+                  <a:srgbClr val="0070C0"/>
+                </a:solidFill>
+              </a:rPr>
+              <a:t>()</a:t>
+            </a:r>
+          </a:p>
+          <a:p>
+            <a:pPr marL="171450" indent="-171450">
+              <a:buFont typeface="Arial" panose="020B0604020202020204" pitchFamily="34" charset="0"/>
+              <a:buChar char="•"/>
+            </a:pPr>
+            <a:r>
+              <a:rPr lang="fr-FR" sz="500" dirty="0" err="1">
+                <a:solidFill>
+                  <a:srgbClr val="0070C0"/>
+                </a:solidFill>
+              </a:rPr>
+              <a:t>dleft</a:t>
+            </a:r>
+            <a:r>
+              <a:rPr lang="fr-FR" sz="500" dirty="0">
+                <a:solidFill>
+                  <a:srgbClr val="0070C0"/>
+                </a:solidFill>
+              </a:rPr>
+              <a:t>()</a:t>
+            </a:r>
+          </a:p>
+        </p:txBody>
+      </p:sp>
+      <p:cxnSp>
+        <p:nvCxnSpPr>
+          <p:cNvPr id="34" name="Connecteur droit avec flèche 33">
+            <a:extLst>
+              <a:ext uri="{FF2B5EF4-FFF2-40B4-BE49-F238E27FC236}">
+                <a16:creationId xmlns:a16="http://schemas.microsoft.com/office/drawing/2014/main" id="{3A8B880E-2668-4573-96AC-307576F49E1A}"/>
+              </a:ext>
+            </a:extLst>
+          </p:cNvPr>
+          <p:cNvCxnSpPr>
+            <a:cxnSpLocks/>
+            <a:stCxn id="27" idx="2"/>
+            <a:endCxn id="33" idx="0"/>
+          </p:cNvCxnSpPr>
+          <p:nvPr/>
+        </p:nvCxnSpPr>
+        <p:spPr>
+          <a:xfrm>
+            <a:off x="6262887" y="2816953"/>
+            <a:ext cx="1248421" cy="377966"/>
           </a:xfrm>
           <a:prstGeom prst="straightConnector1">
             <a:avLst/>
@@ -4244,24 +5040,24 @@
       </p:cxnSp>
       <p:cxnSp>
         <p:nvCxnSpPr>
-          <p:cNvPr id="25" name="Connecteur droit avec flèche 24">
-            <a:extLst>
-              <a:ext uri="{FF2B5EF4-FFF2-40B4-BE49-F238E27FC236}">
-                <a16:creationId xmlns:a16="http://schemas.microsoft.com/office/drawing/2014/main" id="{3CD34A56-7DF2-4289-AB69-C9B2283A878D}"/>
+          <p:cNvPr id="35" name="Connecteur droit avec flèche 34">
+            <a:extLst>
+              <a:ext uri="{FF2B5EF4-FFF2-40B4-BE49-F238E27FC236}">
+                <a16:creationId xmlns:a16="http://schemas.microsoft.com/office/drawing/2014/main" id="{B5A0FB73-3C45-4B92-9937-F28F4FF56129}"/>
               </a:ext>
             </a:extLst>
           </p:cNvPr>
           <p:cNvCxnSpPr>
             <a:cxnSpLocks/>
-            <a:stCxn id="14" idx="2"/>
-            <a:endCxn id="28" idx="0"/>
+            <a:stCxn id="27" idx="2"/>
+            <a:endCxn id="29" idx="0"/>
           </p:cNvCxnSpPr>
           <p:nvPr/>
         </p:nvCxnSpPr>
         <p:spPr>
-          <a:xfrm flipH="1">
-            <a:off x="3829709" y="2709320"/>
-            <a:ext cx="260753" cy="197245"/>
+          <a:xfrm>
+            <a:off x="6262887" y="2816953"/>
+            <a:ext cx="3810" cy="379561"/>
           </a:xfrm>
           <a:prstGeom prst="straightConnector1">
             <a:avLst/>
@@ -4285,187 +5081,26 @@
           </a:fontRef>
         </p:style>
       </p:cxnSp>
-      <p:sp>
-        <p:nvSpPr>
-          <p:cNvPr id="28" name="Rectangle 27">
-            <a:extLst>
-              <a:ext uri="{FF2B5EF4-FFF2-40B4-BE49-F238E27FC236}">
-                <a16:creationId xmlns:a16="http://schemas.microsoft.com/office/drawing/2014/main" id="{658A720D-2DEB-40AA-901B-9E2D4CDAE949}"/>
-              </a:ext>
-            </a:extLst>
-          </p:cNvPr>
-          <p:cNvSpPr/>
-          <p:nvPr/>
-        </p:nvSpPr>
-        <p:spPr>
-          <a:xfrm>
-            <a:off x="3589365" y="2906565"/>
-            <a:ext cx="480688" cy="256905"/>
-          </a:xfrm>
-          <a:prstGeom prst="rect">
-            <a:avLst/>
-          </a:prstGeom>
-          <a:ln w="6350"/>
-        </p:spPr>
-        <p:style>
-          <a:lnRef idx="2">
-            <a:schemeClr val="dk1"/>
-          </a:lnRef>
-          <a:fillRef idx="1">
-            <a:schemeClr val="lt1"/>
-          </a:fillRef>
-          <a:effectRef idx="0">
-            <a:schemeClr val="dk1"/>
-          </a:effectRef>
-          <a:fontRef idx="minor">
-            <a:schemeClr val="dk1"/>
-          </a:fontRef>
-        </p:style>
-        <p:txBody>
-          <a:bodyPr rtlCol="0" anchor="ctr"/>
-          <a:lstStyle/>
-          <a:p>
-            <a:pPr algn="ctr"/>
-            <a:r>
-              <a:rPr lang="fr-FR" sz="700" dirty="0"/>
-              <a:t>Button</a:t>
-            </a:r>
-            <a:endParaRPr lang="fr-BE" sz="700" dirty="0"/>
-          </a:p>
-        </p:txBody>
-      </p:sp>
-      <p:sp>
-        <p:nvSpPr>
-          <p:cNvPr id="32" name="Rectangle 31">
-            <a:extLst>
-              <a:ext uri="{FF2B5EF4-FFF2-40B4-BE49-F238E27FC236}">
-                <a16:creationId xmlns:a16="http://schemas.microsoft.com/office/drawing/2014/main" id="{EB5A9545-B7E4-4D67-89BE-38C276A2D324}"/>
-              </a:ext>
-            </a:extLst>
-          </p:cNvPr>
-          <p:cNvSpPr/>
-          <p:nvPr/>
-        </p:nvSpPr>
-        <p:spPr>
-          <a:xfrm>
-            <a:off x="4104048" y="2906564"/>
-            <a:ext cx="480688" cy="256905"/>
-          </a:xfrm>
-          <a:prstGeom prst="rect">
-            <a:avLst/>
-          </a:prstGeom>
-          <a:ln w="6350"/>
-        </p:spPr>
-        <p:style>
-          <a:lnRef idx="2">
-            <a:schemeClr val="dk1"/>
-          </a:lnRef>
-          <a:fillRef idx="1">
-            <a:schemeClr val="lt1"/>
-          </a:fillRef>
-          <a:effectRef idx="0">
-            <a:schemeClr val="dk1"/>
-          </a:effectRef>
-          <a:fontRef idx="minor">
-            <a:schemeClr val="dk1"/>
-          </a:fontRef>
-        </p:style>
-        <p:txBody>
-          <a:bodyPr rtlCol="0" anchor="ctr"/>
-          <a:lstStyle/>
-          <a:p>
-            <a:pPr algn="ctr"/>
-            <a:r>
-              <a:rPr lang="fr-FR" sz="700" dirty="0"/>
-              <a:t>Button</a:t>
-            </a:r>
-            <a:endParaRPr lang="fr-BE" sz="700" dirty="0"/>
-          </a:p>
-        </p:txBody>
-      </p:sp>
-      <p:sp>
-        <p:nvSpPr>
-          <p:cNvPr id="27" name="Rectangle 26">
-            <a:extLst>
-              <a:ext uri="{FF2B5EF4-FFF2-40B4-BE49-F238E27FC236}">
-                <a16:creationId xmlns:a16="http://schemas.microsoft.com/office/drawing/2014/main" id="{69555244-E172-4C78-9E91-13A48D6EFF5C}"/>
-              </a:ext>
-            </a:extLst>
-          </p:cNvPr>
-          <p:cNvSpPr/>
-          <p:nvPr/>
-        </p:nvSpPr>
-        <p:spPr>
-          <a:xfrm>
-            <a:off x="4927841" y="1912442"/>
-            <a:ext cx="811941" cy="276430"/>
-          </a:xfrm>
-          <a:prstGeom prst="rect">
-            <a:avLst/>
-          </a:prstGeom>
-          <a:noFill/>
-          <a:ln w="6350">
-            <a:solidFill>
-              <a:schemeClr val="tx1"/>
-            </a:solidFill>
-          </a:ln>
-        </p:spPr>
-        <p:style>
-          <a:lnRef idx="2">
-            <a:schemeClr val="accent1">
-              <a:shade val="50000"/>
-            </a:schemeClr>
-          </a:lnRef>
-          <a:fillRef idx="1">
-            <a:schemeClr val="accent1"/>
-          </a:fillRef>
-          <a:effectRef idx="0">
-            <a:schemeClr val="accent1"/>
-          </a:effectRef>
-          <a:fontRef idx="minor">
-            <a:schemeClr val="lt1"/>
-          </a:fontRef>
-        </p:style>
-        <p:txBody>
-          <a:bodyPr rtlCol="0" anchor="ctr"/>
-          <a:lstStyle/>
-          <a:p>
-            <a:pPr algn="ctr"/>
-            <a:r>
-              <a:rPr lang="fr-FR" sz="800" dirty="0">
-                <a:solidFill>
-                  <a:schemeClr val="tx1"/>
-                </a:solidFill>
-              </a:rPr>
-              <a:t>Controller</a:t>
-            </a:r>
-            <a:endParaRPr lang="fr-BE" sz="800" dirty="0">
-              <a:solidFill>
-                <a:schemeClr val="tx1"/>
-              </a:solidFill>
-            </a:endParaRPr>
-          </a:p>
-        </p:txBody>
-      </p:sp>
       <p:cxnSp>
         <p:nvCxnSpPr>
-          <p:cNvPr id="4" name="Connecteur droit avec flèche 3">
-            <a:extLst>
-              <a:ext uri="{FF2B5EF4-FFF2-40B4-BE49-F238E27FC236}">
-                <a16:creationId xmlns:a16="http://schemas.microsoft.com/office/drawing/2014/main" id="{6BD49D05-4F85-46F5-82CC-25F46C9080B8}"/>
+          <p:cNvPr id="55" name="Connecteur droit avec flèche 54">
+            <a:extLst>
+              <a:ext uri="{FF2B5EF4-FFF2-40B4-BE49-F238E27FC236}">
+                <a16:creationId xmlns:a16="http://schemas.microsoft.com/office/drawing/2014/main" id="{7EBA9387-3BB6-4B38-904F-87AEDC891633}"/>
               </a:ext>
             </a:extLst>
           </p:cNvPr>
           <p:cNvCxnSpPr>
-            <a:stCxn id="40" idx="2"/>
-            <a:endCxn id="27" idx="0"/>
+            <a:cxnSpLocks/>
+            <a:stCxn id="27" idx="2"/>
+            <a:endCxn id="57" idx="0"/>
           </p:cNvCxnSpPr>
           <p:nvPr/>
         </p:nvCxnSpPr>
         <p:spPr>
-          <a:xfrm>
-            <a:off x="3383395" y="1674391"/>
-            <a:ext cx="1950417" cy="238051"/>
+          <a:xfrm flipH="1">
+            <a:off x="5111262" y="2816953"/>
+            <a:ext cx="1151625" cy="379561"/>
           </a:xfrm>
           <a:prstGeom prst="straightConnector1">
             <a:avLst/>
@@ -4491,10 +5126,10 @@
       </p:cxnSp>
       <p:sp>
         <p:nvSpPr>
-          <p:cNvPr id="29" name="Rectangle 28">
-            <a:extLst>
-              <a:ext uri="{FF2B5EF4-FFF2-40B4-BE49-F238E27FC236}">
-                <a16:creationId xmlns:a16="http://schemas.microsoft.com/office/drawing/2014/main" id="{DCEF24D3-0F6B-4223-A1B6-2DEB4DF0C4BC}"/>
+          <p:cNvPr id="57" name="Rectangle 56">
+            <a:extLst>
+              <a:ext uri="{FF2B5EF4-FFF2-40B4-BE49-F238E27FC236}">
+                <a16:creationId xmlns:a16="http://schemas.microsoft.com/office/drawing/2014/main" id="{1D8A8E27-49A4-4500-B02A-C1A89708B0E1}"/>
               </a:ext>
             </a:extLst>
           </p:cNvPr>
@@ -4503,8 +5138,8 @@
         </p:nvSpPr>
         <p:spPr>
           <a:xfrm>
-            <a:off x="4554390" y="2452415"/>
-            <a:ext cx="507400" cy="256905"/>
+            <a:off x="4844285" y="3196514"/>
+            <a:ext cx="533954" cy="256905"/>
           </a:xfrm>
           <a:prstGeom prst="rect">
             <a:avLst/>
@@ -4531,82 +5166,41 @@
           <a:p>
             <a:pPr algn="ctr"/>
             <a:r>
-              <a:rPr lang="fr-FR" sz="700" dirty="0" err="1"/>
-              <a:t>PID_obj</a:t>
-            </a:r>
-            <a:endParaRPr lang="fr-BE" sz="700" dirty="0"/>
-          </a:p>
-        </p:txBody>
-      </p:sp>
-      <p:sp>
-        <p:nvSpPr>
-          <p:cNvPr id="33" name="Rectangle 32">
-            <a:extLst>
-              <a:ext uri="{FF2B5EF4-FFF2-40B4-BE49-F238E27FC236}">
-                <a16:creationId xmlns:a16="http://schemas.microsoft.com/office/drawing/2014/main" id="{A8994D85-AACC-45E5-9C36-C9ED0B334878}"/>
-              </a:ext>
-            </a:extLst>
-          </p:cNvPr>
-          <p:cNvSpPr/>
-          <p:nvPr/>
-        </p:nvSpPr>
-        <p:spPr>
-          <a:xfrm>
-            <a:off x="5082849" y="2449183"/>
-            <a:ext cx="507399" cy="256905"/>
-          </a:xfrm>
-          <a:prstGeom prst="rect">
-            <a:avLst/>
-          </a:prstGeom>
-          <a:ln w="6350"/>
-        </p:spPr>
-        <p:style>
-          <a:lnRef idx="2">
-            <a:schemeClr val="dk1"/>
-          </a:lnRef>
-          <a:fillRef idx="1">
-            <a:schemeClr val="lt1"/>
-          </a:fillRef>
-          <a:effectRef idx="0">
-            <a:schemeClr val="dk1"/>
-          </a:effectRef>
-          <a:fontRef idx="minor">
-            <a:schemeClr val="dk1"/>
-          </a:fontRef>
-        </p:style>
-        <p:txBody>
-          <a:bodyPr rtlCol="0" anchor="ctr"/>
-          <a:lstStyle/>
-          <a:p>
-            <a:pPr algn="ctr"/>
-            <a:r>
-              <a:rPr lang="fr-FR" sz="700" dirty="0"/>
-              <a:t>DEO2Rpi</a:t>
-            </a:r>
-            <a:endParaRPr lang="fr-BE" sz="700" dirty="0"/>
+              <a:rPr lang="fr-FR" sz="700" dirty="0" err="1">
+                <a:solidFill>
+                  <a:srgbClr val="FF0000"/>
+                </a:solidFill>
+              </a:rPr>
+              <a:t>MyRobot</a:t>
+            </a:r>
+            <a:endParaRPr lang="fr-BE" sz="700" dirty="0">
+              <a:solidFill>
+                <a:srgbClr val="FF0000"/>
+              </a:solidFill>
+            </a:endParaRPr>
           </a:p>
         </p:txBody>
       </p:sp>
       <p:cxnSp>
         <p:nvCxnSpPr>
-          <p:cNvPr id="34" name="Connecteur droit avec flèche 33">
-            <a:extLst>
-              <a:ext uri="{FF2B5EF4-FFF2-40B4-BE49-F238E27FC236}">
-                <a16:creationId xmlns:a16="http://schemas.microsoft.com/office/drawing/2014/main" id="{3A8B880E-2668-4573-96AC-307576F49E1A}"/>
+          <p:cNvPr id="97" name="Connecteur droit avec flèche 96">
+            <a:extLst>
+              <a:ext uri="{FF2B5EF4-FFF2-40B4-BE49-F238E27FC236}">
+                <a16:creationId xmlns:a16="http://schemas.microsoft.com/office/drawing/2014/main" id="{7382014B-C2C3-4311-86B8-BC91DB5CEB81}"/>
               </a:ext>
             </a:extLst>
           </p:cNvPr>
           <p:cNvCxnSpPr>
             <a:cxnSpLocks/>
-            <a:stCxn id="27" idx="2"/>
-            <a:endCxn id="33" idx="0"/>
+            <a:stCxn id="33" idx="2"/>
+            <a:endCxn id="98" idx="0"/>
           </p:cNvCxnSpPr>
           <p:nvPr/>
         </p:nvCxnSpPr>
         <p:spPr>
-          <a:xfrm>
-            <a:off x="5333812" y="2188872"/>
-            <a:ext cx="2737" cy="260311"/>
+          <a:xfrm flipH="1">
+            <a:off x="7080392" y="3590693"/>
+            <a:ext cx="430916" cy="310944"/>
           </a:xfrm>
           <a:prstGeom prst="straightConnector1">
             <a:avLst/>
@@ -4630,26 +5224,83 @@
           </a:fontRef>
         </p:style>
       </p:cxnSp>
+      <p:sp>
+        <p:nvSpPr>
+          <p:cNvPr id="98" name="Rectangle 97">
+            <a:extLst>
+              <a:ext uri="{FF2B5EF4-FFF2-40B4-BE49-F238E27FC236}">
+                <a16:creationId xmlns:a16="http://schemas.microsoft.com/office/drawing/2014/main" id="{491D635B-5F52-4D83-881A-4B6D7750ACB1}"/>
+              </a:ext>
+            </a:extLst>
+          </p:cNvPr>
+          <p:cNvSpPr/>
+          <p:nvPr/>
+        </p:nvSpPr>
+        <p:spPr>
+          <a:xfrm>
+            <a:off x="6724239" y="3901637"/>
+            <a:ext cx="712305" cy="256905"/>
+          </a:xfrm>
+          <a:prstGeom prst="rect">
+            <a:avLst/>
+          </a:prstGeom>
+          <a:ln w="6350"/>
+        </p:spPr>
+        <p:style>
+          <a:lnRef idx="2">
+            <a:schemeClr val="dk1"/>
+          </a:lnRef>
+          <a:fillRef idx="1">
+            <a:schemeClr val="lt1"/>
+          </a:fillRef>
+          <a:effectRef idx="0">
+            <a:schemeClr val="dk1"/>
+          </a:effectRef>
+          <a:fontRef idx="minor">
+            <a:schemeClr val="dk1"/>
+          </a:fontRef>
+        </p:style>
+        <p:txBody>
+          <a:bodyPr rtlCol="0" anchor="ctr"/>
+          <a:lstStyle/>
+          <a:p>
+            <a:pPr algn="ctr"/>
+            <a:r>
+              <a:rPr lang="fr-FR" sz="700" dirty="0" err="1">
+                <a:solidFill>
+                  <a:srgbClr val="FF0000"/>
+                </a:solidFill>
+              </a:rPr>
+              <a:t>MyController</a:t>
+            </a:r>
+            <a:endParaRPr lang="fr-BE" sz="700" dirty="0">
+              <a:solidFill>
+                <a:srgbClr val="FF0000"/>
+              </a:solidFill>
+            </a:endParaRPr>
+          </a:p>
+        </p:txBody>
+      </p:sp>
       <p:cxnSp>
         <p:nvCxnSpPr>
-          <p:cNvPr id="35" name="Connecteur droit avec flèche 34">
-            <a:extLst>
-              <a:ext uri="{FF2B5EF4-FFF2-40B4-BE49-F238E27FC236}">
-                <a16:creationId xmlns:a16="http://schemas.microsoft.com/office/drawing/2014/main" id="{B5A0FB73-3C45-4B92-9937-F28F4FF56129}"/>
+          <p:cNvPr id="103" name="Connecteur droit avec flèche 102">
+            <a:extLst>
+              <a:ext uri="{FF2B5EF4-FFF2-40B4-BE49-F238E27FC236}">
+                <a16:creationId xmlns:a16="http://schemas.microsoft.com/office/drawing/2014/main" id="{95146809-10DB-418D-BA51-503D721EDFDA}"/>
               </a:ext>
             </a:extLst>
           </p:cNvPr>
           <p:cNvCxnSpPr>
             <a:cxnSpLocks/>
-            <a:stCxn id="27" idx="2"/>
-            <a:endCxn id="29" idx="0"/>
+            <a:stCxn id="33" idx="2"/>
+            <a:endCxn id="104" idx="0"/>
           </p:cNvCxnSpPr>
           <p:nvPr/>
         </p:nvCxnSpPr>
         <p:spPr>
-          <a:xfrm flipH="1">
-            <a:off x="4808090" y="2188872"/>
-            <a:ext cx="525722" cy="263543"/>
+          <a:xfrm>
+            <a:off x="7511308" y="3590693"/>
+            <a:ext cx="532483" cy="312366"/>
           </a:xfrm>
           <a:prstGeom prst="straightConnector1">
             <a:avLst/>
@@ -4673,65 +5324,22 @@
           </a:fontRef>
         </p:style>
       </p:cxnSp>
-      <p:cxnSp>
-        <p:nvCxnSpPr>
-          <p:cNvPr id="55" name="Connecteur droit avec flèche 54">
-            <a:extLst>
-              <a:ext uri="{FF2B5EF4-FFF2-40B4-BE49-F238E27FC236}">
-                <a16:creationId xmlns:a16="http://schemas.microsoft.com/office/drawing/2014/main" id="{7EBA9387-3BB6-4B38-904F-87AEDC891633}"/>
-              </a:ext>
-            </a:extLst>
-          </p:cNvPr>
-          <p:cNvCxnSpPr>
-            <a:cxnSpLocks/>
-            <a:stCxn id="27" idx="2"/>
-            <a:endCxn id="57" idx="0"/>
-          </p:cNvCxnSpPr>
+      <p:sp>
+        <p:nvSpPr>
+          <p:cNvPr id="104" name="Rectangle 103">
+            <a:extLst>
+              <a:ext uri="{FF2B5EF4-FFF2-40B4-BE49-F238E27FC236}">
+                <a16:creationId xmlns:a16="http://schemas.microsoft.com/office/drawing/2014/main" id="{A3B295E3-117D-4792-93A3-3102A294FF9A}"/>
+              </a:ext>
+            </a:extLst>
+          </p:cNvPr>
+          <p:cNvSpPr/>
           <p:nvPr/>
-        </p:nvCxnSpPr>
+        </p:nvSpPr>
         <p:spPr>
           <a:xfrm>
-            <a:off x="5333812" y="2188872"/>
-            <a:ext cx="531195" cy="260311"/>
-          </a:xfrm>
-          <a:prstGeom prst="straightConnector1">
-            <a:avLst/>
-          </a:prstGeom>
-          <a:ln>
-            <a:tailEnd type="triangle"/>
-          </a:ln>
-        </p:spPr>
-        <p:style>
-          <a:lnRef idx="1">
-            <a:schemeClr val="dk1"/>
-          </a:lnRef>
-          <a:fillRef idx="0">
-            <a:schemeClr val="dk1"/>
-          </a:fillRef>
-          <a:effectRef idx="0">
-            <a:schemeClr val="dk1"/>
-          </a:effectRef>
-          <a:fontRef idx="minor">
-            <a:schemeClr val="tx1"/>
-          </a:fontRef>
-        </p:style>
-      </p:cxnSp>
-      <p:sp>
-        <p:nvSpPr>
-          <p:cNvPr id="57" name="Rectangle 56">
-            <a:extLst>
-              <a:ext uri="{FF2B5EF4-FFF2-40B4-BE49-F238E27FC236}">
-                <a16:creationId xmlns:a16="http://schemas.microsoft.com/office/drawing/2014/main" id="{1D8A8E27-49A4-4500-B02A-C1A89708B0E1}"/>
-              </a:ext>
-            </a:extLst>
-          </p:cNvPr>
-          <p:cNvSpPr/>
-          <p:nvPr/>
-        </p:nvSpPr>
-        <p:spPr>
-          <a:xfrm>
-            <a:off x="5611307" y="2449183"/>
-            <a:ext cx="507399" cy="256905"/>
+            <a:off x="7728980" y="3903059"/>
+            <a:ext cx="629621" cy="256905"/>
           </a:xfrm>
           <a:prstGeom prst="rect">
             <a:avLst/>
@@ -4757,7 +5365,38 @@
           <a:lstStyle/>
           <a:p>
             <a:pPr algn="ctr"/>
-            <a:endParaRPr lang="fr-BE" sz="700" dirty="0"/>
+            <a:r>
+              <a:rPr lang="fr-FR" sz="700" b="1" i="1" dirty="0" err="1">
+                <a:solidFill>
+                  <a:schemeClr val="accent6"/>
+                </a:solidFill>
+              </a:rPr>
+              <a:t>myThread</a:t>
+            </a:r>
+            <a:endParaRPr lang="fr-FR" sz="700" b="1" i="1" dirty="0">
+              <a:solidFill>
+                <a:schemeClr val="accent6"/>
+              </a:solidFill>
+            </a:endParaRPr>
+          </a:p>
+          <a:p>
+            <a:pPr marL="171450" indent="-171450">
+              <a:buFont typeface="Arial" panose="020B0604020202020204" pitchFamily="34" charset="0"/>
+              <a:buChar char="•"/>
+            </a:pPr>
+            <a:r>
+              <a:rPr lang="fr-FR" sz="500" dirty="0">
+                <a:solidFill>
+                  <a:schemeClr val="accent5"/>
+                </a:solidFill>
+              </a:rPr>
+              <a:t>Run()</a:t>
+            </a:r>
+            <a:endParaRPr lang="fr-BE" sz="400" dirty="0">
+              <a:solidFill>
+                <a:schemeClr val="accent5"/>
+              </a:solidFill>
+            </a:endParaRPr>
           </a:p>
         </p:txBody>
       </p:sp>

</xml_diff>

<commit_message>
Debug ended, go to functionnality
</commit_message>
<xml_diff>
--- a/schemeofcode.pptx
+++ b/schemeofcode.pptx
@@ -262,7 +262,7 @@
           <a:p>
             <a:fld id="{7A3C3441-2C70-4949-8FF7-1C72443CF9D3}" type="datetimeFigureOut">
               <a:rPr lang="fr-BE" smtClean="0"/>
-              <a:t>07-12-21</a:t>
+              <a:t>08-12-21</a:t>
             </a:fld>
             <a:endParaRPr lang="fr-BE"/>
           </a:p>
@@ -462,7 +462,7 @@
           <a:p>
             <a:fld id="{7A3C3441-2C70-4949-8FF7-1C72443CF9D3}" type="datetimeFigureOut">
               <a:rPr lang="fr-BE" smtClean="0"/>
-              <a:t>07-12-21</a:t>
+              <a:t>08-12-21</a:t>
             </a:fld>
             <a:endParaRPr lang="fr-BE"/>
           </a:p>
@@ -672,7 +672,7 @@
           <a:p>
             <a:fld id="{7A3C3441-2C70-4949-8FF7-1C72443CF9D3}" type="datetimeFigureOut">
               <a:rPr lang="fr-BE" smtClean="0"/>
-              <a:t>07-12-21</a:t>
+              <a:t>08-12-21</a:t>
             </a:fld>
             <a:endParaRPr lang="fr-BE"/>
           </a:p>
@@ -872,7 +872,7 @@
           <a:p>
             <a:fld id="{7A3C3441-2C70-4949-8FF7-1C72443CF9D3}" type="datetimeFigureOut">
               <a:rPr lang="fr-BE" smtClean="0"/>
-              <a:t>07-12-21</a:t>
+              <a:t>08-12-21</a:t>
             </a:fld>
             <a:endParaRPr lang="fr-BE"/>
           </a:p>
@@ -1148,7 +1148,7 @@
           <a:p>
             <a:fld id="{7A3C3441-2C70-4949-8FF7-1C72443CF9D3}" type="datetimeFigureOut">
               <a:rPr lang="fr-BE" smtClean="0"/>
-              <a:t>07-12-21</a:t>
+              <a:t>08-12-21</a:t>
             </a:fld>
             <a:endParaRPr lang="fr-BE"/>
           </a:p>
@@ -1416,7 +1416,7 @@
           <a:p>
             <a:fld id="{7A3C3441-2C70-4949-8FF7-1C72443CF9D3}" type="datetimeFigureOut">
               <a:rPr lang="fr-BE" smtClean="0"/>
-              <a:t>07-12-21</a:t>
+              <a:t>08-12-21</a:t>
             </a:fld>
             <a:endParaRPr lang="fr-BE"/>
           </a:p>
@@ -1831,7 +1831,7 @@
           <a:p>
             <a:fld id="{7A3C3441-2C70-4949-8FF7-1C72443CF9D3}" type="datetimeFigureOut">
               <a:rPr lang="fr-BE" smtClean="0"/>
-              <a:t>07-12-21</a:t>
+              <a:t>08-12-21</a:t>
             </a:fld>
             <a:endParaRPr lang="fr-BE"/>
           </a:p>
@@ -1973,7 +1973,7 @@
           <a:p>
             <a:fld id="{7A3C3441-2C70-4949-8FF7-1C72443CF9D3}" type="datetimeFigureOut">
               <a:rPr lang="fr-BE" smtClean="0"/>
-              <a:t>07-12-21</a:t>
+              <a:t>08-12-21</a:t>
             </a:fld>
             <a:endParaRPr lang="fr-BE"/>
           </a:p>
@@ -2086,7 +2086,7 @@
           <a:p>
             <a:fld id="{7A3C3441-2C70-4949-8FF7-1C72443CF9D3}" type="datetimeFigureOut">
               <a:rPr lang="fr-BE" smtClean="0"/>
-              <a:t>07-12-21</a:t>
+              <a:t>08-12-21</a:t>
             </a:fld>
             <a:endParaRPr lang="fr-BE"/>
           </a:p>
@@ -2399,7 +2399,7 @@
           <a:p>
             <a:fld id="{7A3C3441-2C70-4949-8FF7-1C72443CF9D3}" type="datetimeFigureOut">
               <a:rPr lang="fr-BE" smtClean="0"/>
-              <a:t>07-12-21</a:t>
+              <a:t>08-12-21</a:t>
             </a:fld>
             <a:endParaRPr lang="fr-BE"/>
           </a:p>
@@ -2688,7 +2688,7 @@
           <a:p>
             <a:fld id="{7A3C3441-2C70-4949-8FF7-1C72443CF9D3}" type="datetimeFigureOut">
               <a:rPr lang="fr-BE" smtClean="0"/>
-              <a:t>07-12-21</a:t>
+              <a:t>08-12-21</a:t>
             </a:fld>
             <a:endParaRPr lang="fr-BE"/>
           </a:p>
@@ -2931,7 +2931,7 @@
           <a:p>
             <a:fld id="{7A3C3441-2C70-4949-8FF7-1C72443CF9D3}" type="datetimeFigureOut">
               <a:rPr lang="fr-BE" smtClean="0"/>
-              <a:t>07-12-21</a:t>
+              <a:t>08-12-21</a:t>
             </a:fld>
             <a:endParaRPr lang="fr-BE"/>
           </a:p>
@@ -3855,7 +3855,7 @@
         </p:nvSpPr>
         <p:spPr>
           <a:xfrm>
-            <a:off x="1120050" y="1061956"/>
+            <a:off x="1166339" y="1158153"/>
             <a:ext cx="1680302" cy="307777"/>
           </a:xfrm>
           <a:prstGeom prst="rect">
@@ -4166,16 +4166,16 @@
           <a:p>
             <a:pPr algn="ctr"/>
             <a:r>
-              <a:rPr lang="fr-FR" sz="800" dirty="0" err="1">
-                <a:solidFill>
-                  <a:schemeClr val="tx1"/>
+              <a:rPr lang="fr-FR" sz="800" b="1" i="1" dirty="0" err="1">
+                <a:solidFill>
+                  <a:schemeClr val="accent6"/>
                 </a:solidFill>
               </a:rPr>
-              <a:t>actuators</a:t>
-            </a:r>
-            <a:endParaRPr lang="fr-BE" sz="800" dirty="0">
+              <a:t>Actuators</a:t>
+            </a:r>
+            <a:endParaRPr lang="fr-BE" sz="800" b="1" i="1" dirty="0">
               <a:solidFill>
-                <a:schemeClr val="tx1"/>
+                <a:schemeClr val="accent6"/>
               </a:solidFill>
             </a:endParaRPr>
           </a:p>

</xml_diff>